<commit_message>
Add more git commands to play with
</commit_message>
<xml_diff>
--- a/From CVS to GIT.pptx
+++ b/From CVS to GIT.pptx
@@ -21,8 +21,14 @@
     <p:sldId id="269" r:id="rId15"/>
     <p:sldId id="273" r:id="rId16"/>
     <p:sldId id="272" r:id="rId17"/>
-    <p:sldId id="274" r:id="rId18"/>
-    <p:sldId id="271" r:id="rId19"/>
+    <p:sldId id="275" r:id="rId18"/>
+    <p:sldId id="276" r:id="rId19"/>
+    <p:sldId id="277" r:id="rId20"/>
+    <p:sldId id="278" r:id="rId21"/>
+    <p:sldId id="279" r:id="rId22"/>
+    <p:sldId id="280" r:id="rId23"/>
+    <p:sldId id="274" r:id="rId24"/>
+    <p:sldId id="271" r:id="rId25"/>
   </p:sldIdLst>
   <p:sldSz cx="9144000" cy="6858000" type="screen4x3"/>
   <p:notesSz cx="6858000" cy="9144000"/>
@@ -4982,45 +4988,14 @@
       </p:sp>
       <p:sp>
         <p:nvSpPr>
-          <p:cNvPr id="22" name="21 CuadroTexto"/>
-          <p:cNvSpPr txBox="1"/>
-          <p:nvPr/>
-        </p:nvSpPr>
-        <p:spPr>
-          <a:xfrm>
-            <a:off x="0" y="2207436"/>
-            <a:ext cx="9144000" cy="830997"/>
-          </a:xfrm>
-          <a:prstGeom prst="rect">
-            <a:avLst/>
-          </a:prstGeom>
-          <a:noFill/>
-        </p:spPr>
-        <p:txBody>
-          <a:bodyPr wrap="square" rtlCol="0">
-            <a:spAutoFit/>
-          </a:bodyPr>
-          <a:lstStyle/>
-          <a:p>
-            <a:pPr algn="ctr"/>
-            <a:r>
-              <a:rPr lang="es-ES" sz="4800" dirty="0" smtClean="0"/>
-              <a:t>ROC VAS PER AQUÍ</a:t>
-            </a:r>
-            <a:endParaRPr lang="ca-ES" sz="4800" dirty="0"/>
-          </a:p>
-        </p:txBody>
-      </p:sp>
-      <p:sp>
-        <p:nvSpPr>
           <p:cNvPr id="2" name="1 Rectángulo"/>
           <p:cNvSpPr/>
           <p:nvPr/>
         </p:nvSpPr>
         <p:spPr>
           <a:xfrm>
-            <a:off x="5494475" y="6488668"/>
-            <a:ext cx="3649525" cy="369332"/>
+            <a:off x="2465120" y="6488668"/>
+            <a:ext cx="6678880" cy="369332"/>
           </a:xfrm>
           <a:prstGeom prst="rect">
             <a:avLst/>
@@ -5033,15 +5008,15 @@
           <a:lstStyle/>
           <a:p>
             <a:r>
-              <a:rPr lang="ca-ES" dirty="0" smtClean="0">
-                <a:solidFill>
-                  <a:schemeClr val="bg1">
-                    <a:lumMod val="50000"/>
-                    <a:lumOff val="50000"/>
-                  </a:schemeClr>
-                </a:solidFill>
-              </a:rPr>
-              <a:t>https://git-scm.com/docs/gitglossary</a:t>
+              <a:rPr lang="ca-ES" dirty="0">
+                <a:solidFill>
+                  <a:schemeClr val="bg1">
+                    <a:lumMod val="50000"/>
+                    <a:lumOff val="50000"/>
+                  </a:schemeClr>
+                </a:solidFill>
+              </a:rPr>
+              <a:t>https://git-scm.com/book/id/v2/Getting-Started-First-Time-Git-Setup</a:t>
             </a:r>
             <a:endParaRPr lang="ca-ES" dirty="0">
               <a:solidFill>
@@ -5062,8 +5037,8 @@
         </p:nvSpPr>
         <p:spPr>
           <a:xfrm>
-            <a:off x="1106615" y="3248610"/>
-            <a:ext cx="6930770" cy="523220"/>
+            <a:off x="1152129" y="3212976"/>
+            <a:ext cx="8460431" cy="954107"/>
           </a:xfrm>
           <a:prstGeom prst="rect">
             <a:avLst/>
@@ -5075,12 +5050,120 @@
           </a:bodyPr>
           <a:lstStyle/>
           <a:p>
+            <a:r>
+              <a:rPr lang="es-ES" sz="2800" dirty="0" err="1" smtClean="0"/>
+              <a:t>git</a:t>
+            </a:r>
+            <a:r>
+              <a:rPr lang="es-ES" sz="2800" dirty="0" smtClean="0"/>
+              <a:t> </a:t>
+            </a:r>
+            <a:r>
+              <a:rPr lang="es-ES" sz="2800" dirty="0" err="1"/>
+              <a:t>config</a:t>
+            </a:r>
+            <a:r>
+              <a:rPr lang="es-ES" sz="2800" dirty="0"/>
+              <a:t> --global user.name </a:t>
+            </a:r>
+            <a:r>
+              <a:rPr lang="es-ES" sz="2800" dirty="0" smtClean="0"/>
+              <a:t>"</a:t>
+            </a:r>
+            <a:r>
+              <a:rPr lang="es-ES" sz="2800" dirty="0" err="1" smtClean="0"/>
+              <a:t>Roc</a:t>
+            </a:r>
+            <a:r>
+              <a:rPr lang="es-ES" sz="2800" dirty="0" smtClean="0"/>
+              <a:t> </a:t>
+            </a:r>
+            <a:r>
+              <a:rPr lang="es-ES" sz="2800" dirty="0" err="1" smtClean="0"/>
+              <a:t>Boronat</a:t>
+            </a:r>
+            <a:r>
+              <a:rPr lang="es-ES" sz="2800" dirty="0" smtClean="0"/>
+              <a:t>"</a:t>
+            </a:r>
+            <a:endParaRPr lang="es-ES" sz="2800" dirty="0"/>
+          </a:p>
+          <a:p>
+            <a:r>
+              <a:rPr lang="es-ES" sz="2800" dirty="0" err="1" smtClean="0"/>
+              <a:t>git</a:t>
+            </a:r>
+            <a:r>
+              <a:rPr lang="es-ES" sz="2800" dirty="0" smtClean="0"/>
+              <a:t> </a:t>
+            </a:r>
+            <a:r>
+              <a:rPr lang="es-ES" sz="2800" dirty="0" err="1"/>
+              <a:t>config</a:t>
+            </a:r>
+            <a:r>
+              <a:rPr lang="es-ES" sz="2800" dirty="0"/>
+              <a:t> --global </a:t>
+            </a:r>
+            <a:r>
+              <a:rPr lang="es-ES" sz="2800" dirty="0" err="1"/>
+              <a:t>user.email</a:t>
+            </a:r>
+            <a:r>
+              <a:rPr lang="es-ES" sz="2800" dirty="0"/>
+              <a:t> </a:t>
+            </a:r>
+            <a:r>
+              <a:rPr lang="es-ES" sz="2800" dirty="0" smtClean="0"/>
+              <a:t>roc@fewlaps.com</a:t>
+            </a:r>
+          </a:p>
+        </p:txBody>
+      </p:sp>
+      <p:sp>
+        <p:nvSpPr>
+          <p:cNvPr id="6" name="5 CuadroTexto"/>
+          <p:cNvSpPr txBox="1"/>
+          <p:nvPr/>
+        </p:nvSpPr>
+        <p:spPr>
+          <a:xfrm>
+            <a:off x="0" y="2207436"/>
+            <a:ext cx="9144000" cy="830997"/>
+          </a:xfrm>
+          <a:prstGeom prst="rect">
+            <a:avLst/>
+          </a:prstGeom>
+          <a:noFill/>
+        </p:spPr>
+        <p:txBody>
+          <a:bodyPr wrap="square" rtlCol="0">
+            <a:spAutoFit/>
+          </a:bodyPr>
+          <a:lstStyle/>
+          <a:p>
             <a:pPr algn="ctr"/>
             <a:r>
-              <a:rPr lang="es-ES" sz="2800" dirty="0" smtClean="0"/>
-              <a:t>ROC VAS PER AQUÍ</a:t>
-            </a:r>
-            <a:endParaRPr lang="ca-ES" sz="2800" dirty="0"/>
+              <a:rPr lang="es-ES" sz="4800" dirty="0" err="1" smtClean="0"/>
+              <a:t>setup</a:t>
+            </a:r>
+            <a:r>
+              <a:rPr lang="es-ES" sz="4800" dirty="0" smtClean="0"/>
+              <a:t> </a:t>
+            </a:r>
+            <a:r>
+              <a:rPr lang="es-ES" sz="4800" dirty="0" err="1" smtClean="0"/>
+              <a:t>your</a:t>
+            </a:r>
+            <a:r>
+              <a:rPr lang="es-ES" sz="4800" dirty="0" smtClean="0"/>
+              <a:t> </a:t>
+            </a:r>
+            <a:r>
+              <a:rPr lang="es-ES" sz="4800" dirty="0" err="1" smtClean="0"/>
+              <a:t>user</a:t>
+            </a:r>
+            <a:endParaRPr lang="ca-ES" sz="4800" dirty="0"/>
           </a:p>
         </p:txBody>
       </p:sp>
@@ -5161,38 +5244,7 @@
             </a:r>
             <a:r>
               <a:rPr lang="es-ES" sz="4800" dirty="0" err="1" smtClean="0"/>
-              <a:t>glossary</a:t>
-            </a:r>
-            <a:endParaRPr lang="ca-ES" sz="4800" dirty="0"/>
-          </a:p>
-        </p:txBody>
-      </p:sp>
-      <p:sp>
-        <p:nvSpPr>
-          <p:cNvPr id="22" name="21 CuadroTexto"/>
-          <p:cNvSpPr txBox="1"/>
-          <p:nvPr/>
-        </p:nvSpPr>
-        <p:spPr>
-          <a:xfrm>
-            <a:off x="0" y="2207436"/>
-            <a:ext cx="9144000" cy="830997"/>
-          </a:xfrm>
-          <a:prstGeom prst="rect">
-            <a:avLst/>
-          </a:prstGeom>
-          <a:noFill/>
-        </p:spPr>
-        <p:txBody>
-          <a:bodyPr wrap="square" rtlCol="0">
-            <a:spAutoFit/>
-          </a:bodyPr>
-          <a:lstStyle/>
-          <a:p>
-            <a:pPr algn="ctr"/>
-            <a:r>
-              <a:rPr lang="es-ES" sz="4800" dirty="0" err="1" smtClean="0"/>
-              <a:t>pull</a:t>
+              <a:t>commands</a:t>
             </a:r>
             <a:endParaRPr lang="ca-ES" sz="4800" dirty="0"/>
           </a:p>
@@ -5206,8 +5258,8 @@
         </p:nvSpPr>
         <p:spPr>
           <a:xfrm>
-            <a:off x="5494475" y="6488668"/>
-            <a:ext cx="3649525" cy="369332"/>
+            <a:off x="2465120" y="6488668"/>
+            <a:ext cx="6678880" cy="369332"/>
           </a:xfrm>
           <a:prstGeom prst="rect">
             <a:avLst/>
@@ -5220,15 +5272,15 @@
           <a:lstStyle/>
           <a:p>
             <a:r>
-              <a:rPr lang="ca-ES" dirty="0" smtClean="0">
-                <a:solidFill>
-                  <a:schemeClr val="bg1">
-                    <a:lumMod val="50000"/>
-                    <a:lumOff val="50000"/>
-                  </a:schemeClr>
-                </a:solidFill>
-              </a:rPr>
-              <a:t>https://git-scm.com/docs/gitglossary</a:t>
+              <a:rPr lang="ca-ES" dirty="0">
+                <a:solidFill>
+                  <a:schemeClr val="bg1">
+                    <a:lumMod val="50000"/>
+                    <a:lumOff val="50000"/>
+                  </a:schemeClr>
+                </a:solidFill>
+              </a:rPr>
+              <a:t>https://git-scm.com/book/id/v2/Getting-Started-First-Time-Git-Setup</a:t>
             </a:r>
             <a:endParaRPr lang="ca-ES" dirty="0">
               <a:solidFill>
@@ -5249,8 +5301,8 @@
         </p:nvSpPr>
         <p:spPr>
           <a:xfrm>
-            <a:off x="1106615" y="3248610"/>
-            <a:ext cx="6930770" cy="523220"/>
+            <a:off x="0" y="3212976"/>
+            <a:ext cx="9144000" cy="523220"/>
           </a:xfrm>
           <a:prstGeom prst="rect">
             <a:avLst/>
@@ -5264,29 +5316,84 @@
           <a:p>
             <a:pPr algn="ctr"/>
             <a:r>
-              <a:rPr lang="en-US" sz="2800" dirty="0" smtClean="0"/>
-              <a:t>To</a:t>
-            </a:r>
-            <a:r>
-              <a:rPr lang="en-US" sz="2800" dirty="0"/>
-              <a:t> fetch </a:t>
-            </a:r>
-            <a:r>
-              <a:rPr lang="en-US" sz="2800" dirty="0" smtClean="0"/>
-              <a:t>a branch and</a:t>
-            </a:r>
-            <a:r>
-              <a:rPr lang="en-US" sz="2800" dirty="0"/>
-              <a:t> merge it.</a:t>
-            </a:r>
-            <a:endParaRPr lang="ca-ES" sz="2800" dirty="0"/>
+              <a:rPr lang="es-ES" sz="2800" dirty="0" err="1" smtClean="0"/>
+              <a:t>git</a:t>
+            </a:r>
+            <a:r>
+              <a:rPr lang="es-ES" sz="2800" dirty="0" smtClean="0"/>
+              <a:t> </a:t>
+            </a:r>
+            <a:r>
+              <a:rPr lang="es-ES" sz="2800" dirty="0" err="1"/>
+              <a:t>config</a:t>
+            </a:r>
+            <a:r>
+              <a:rPr lang="es-ES" sz="2800" dirty="0"/>
+              <a:t> </a:t>
+            </a:r>
+            <a:r>
+              <a:rPr lang="es-ES" sz="2800" dirty="0" smtClean="0"/>
+              <a:t>--</a:t>
+            </a:r>
+            <a:r>
+              <a:rPr lang="es-ES" sz="2800" dirty="0" err="1" smtClean="0"/>
+              <a:t>list</a:t>
+            </a:r>
+            <a:endParaRPr lang="es-ES" sz="2800" dirty="0" smtClean="0"/>
+          </a:p>
+        </p:txBody>
+      </p:sp>
+      <p:sp>
+        <p:nvSpPr>
+          <p:cNvPr id="6" name="5 CuadroTexto"/>
+          <p:cNvSpPr txBox="1"/>
+          <p:nvPr/>
+        </p:nvSpPr>
+        <p:spPr>
+          <a:xfrm>
+            <a:off x="0" y="2207436"/>
+            <a:ext cx="9144000" cy="830997"/>
+          </a:xfrm>
+          <a:prstGeom prst="rect">
+            <a:avLst/>
+          </a:prstGeom>
+          <a:noFill/>
+        </p:spPr>
+        <p:txBody>
+          <a:bodyPr wrap="square" rtlCol="0">
+            <a:spAutoFit/>
+          </a:bodyPr>
+          <a:lstStyle/>
+          <a:p>
+            <a:pPr algn="ctr"/>
+            <a:r>
+              <a:rPr lang="es-ES" sz="4800" dirty="0" err="1" smtClean="0"/>
+              <a:t>check</a:t>
+            </a:r>
+            <a:r>
+              <a:rPr lang="es-ES" sz="4800" dirty="0" smtClean="0"/>
+              <a:t> </a:t>
+            </a:r>
+            <a:r>
+              <a:rPr lang="es-ES" sz="4800" dirty="0" err="1" smtClean="0"/>
+              <a:t>your</a:t>
+            </a:r>
+            <a:r>
+              <a:rPr lang="es-ES" sz="4800" dirty="0" smtClean="0"/>
+              <a:t> </a:t>
+            </a:r>
+            <a:r>
+              <a:rPr lang="es-ES" sz="4800" dirty="0" err="1" smtClean="0"/>
+              <a:t>configuration</a:t>
+            </a:r>
+            <a:endParaRPr lang="ca-ES" sz="4800" dirty="0"/>
           </a:p>
         </p:txBody>
       </p:sp>
     </p:spTree>
     <p:extLst>
       <p:ext uri="{BB962C8B-B14F-4D97-AF65-F5344CB8AC3E}">
-        <p14:creationId xmlns:p14="http://schemas.microsoft.com/office/powerpoint/2010/main" val="3345413051"/>
+        <p14:creationId xmlns:p14="http://schemas.microsoft.com/office/powerpoint/2010/main" val="1908100775"/>
       </p:ext>
     </p:extLst>
   </p:cSld>
@@ -5360,38 +5467,7 @@
             </a:r>
             <a:r>
               <a:rPr lang="es-ES" sz="4800" dirty="0" err="1" smtClean="0"/>
-              <a:t>glossary</a:t>
-            </a:r>
-            <a:endParaRPr lang="ca-ES" sz="4800" dirty="0"/>
-          </a:p>
-        </p:txBody>
-      </p:sp>
-      <p:sp>
-        <p:nvSpPr>
-          <p:cNvPr id="22" name="21 CuadroTexto"/>
-          <p:cNvSpPr txBox="1"/>
-          <p:nvPr/>
-        </p:nvSpPr>
-        <p:spPr>
-          <a:xfrm>
-            <a:off x="0" y="2207436"/>
-            <a:ext cx="9144000" cy="830997"/>
-          </a:xfrm>
-          <a:prstGeom prst="rect">
-            <a:avLst/>
-          </a:prstGeom>
-          <a:noFill/>
-        </p:spPr>
-        <p:txBody>
-          <a:bodyPr wrap="square" rtlCol="0">
-            <a:spAutoFit/>
-          </a:bodyPr>
-          <a:lstStyle/>
-          <a:p>
-            <a:pPr algn="ctr"/>
-            <a:r>
-              <a:rPr lang="es-ES" sz="4800" dirty="0" err="1" smtClean="0"/>
-              <a:t>push</a:t>
+              <a:t>commands</a:t>
             </a:r>
             <a:endParaRPr lang="ca-ES" sz="4800" dirty="0"/>
           </a:p>
@@ -5405,8 +5481,8 @@
         </p:nvSpPr>
         <p:spPr>
           <a:xfrm>
-            <a:off x="5494475" y="6488668"/>
-            <a:ext cx="3649525" cy="369332"/>
+            <a:off x="2465120" y="6488668"/>
+            <a:ext cx="5986447" cy="369332"/>
           </a:xfrm>
           <a:prstGeom prst="rect">
             <a:avLst/>
@@ -5419,15 +5495,15 @@
           <a:lstStyle/>
           <a:p>
             <a:r>
-              <a:rPr lang="ca-ES" dirty="0" smtClean="0">
-                <a:solidFill>
-                  <a:schemeClr val="bg1">
-                    <a:lumMod val="50000"/>
-                    <a:lumOff val="50000"/>
-                  </a:schemeClr>
-                </a:solidFill>
-              </a:rPr>
-              <a:t>https://git-scm.com/docs/gitglossary</a:t>
+              <a:rPr lang="ca-ES" dirty="0">
+                <a:solidFill>
+                  <a:schemeClr val="bg1">
+                    <a:lumMod val="50000"/>
+                    <a:lumOff val="50000"/>
+                  </a:schemeClr>
+                </a:solidFill>
+              </a:rPr>
+              <a:t>https://git-scm.com/book/id/v2/Getting-Started-Getting-Help</a:t>
             </a:r>
             <a:endParaRPr lang="ca-ES" dirty="0">
               <a:solidFill>
@@ -5448,8 +5524,8 @@
         </p:nvSpPr>
         <p:spPr>
           <a:xfrm>
-            <a:off x="1687179" y="3252903"/>
-            <a:ext cx="5769641" cy="954107"/>
+            <a:off x="0" y="3212976"/>
+            <a:ext cx="9144000" cy="523220"/>
           </a:xfrm>
           <a:prstGeom prst="rect">
             <a:avLst/>
@@ -5463,27 +5539,271 @@
           <a:p>
             <a:pPr algn="ctr"/>
             <a:r>
-              <a:rPr lang="en-US" sz="2800" dirty="0" smtClean="0">
-                <a:effectLst/>
-              </a:rPr>
-              <a:t>To put local objects into the remote </a:t>
-            </a:r>
-            <a:r>
-              <a:rPr lang="en-US" sz="2800" dirty="0"/>
-              <a:t>object </a:t>
-            </a:r>
-            <a:r>
-              <a:rPr lang="en-US" sz="2800" dirty="0" smtClean="0"/>
-              <a:t>database</a:t>
-            </a:r>
-            <a:endParaRPr lang="ca-ES" sz="2800" dirty="0"/>
+              <a:rPr lang="es-ES" sz="2800" dirty="0" err="1" smtClean="0"/>
+              <a:t>git</a:t>
+            </a:r>
+            <a:r>
+              <a:rPr lang="es-ES" sz="2800" dirty="0" smtClean="0"/>
+              <a:t> </a:t>
+            </a:r>
+            <a:r>
+              <a:rPr lang="es-ES" sz="2800" dirty="0" err="1" smtClean="0"/>
+              <a:t>help</a:t>
+            </a:r>
+            <a:r>
+              <a:rPr lang="es-ES" sz="2800" dirty="0" smtClean="0"/>
+              <a:t> </a:t>
+            </a:r>
+            <a:r>
+              <a:rPr lang="es-ES" sz="2800" dirty="0" err="1" smtClean="0"/>
+              <a:t>commit</a:t>
+            </a:r>
+            <a:endParaRPr lang="es-ES" sz="2800" dirty="0" smtClean="0"/>
+          </a:p>
+        </p:txBody>
+      </p:sp>
+      <p:sp>
+        <p:nvSpPr>
+          <p:cNvPr id="6" name="5 CuadroTexto"/>
+          <p:cNvSpPr txBox="1"/>
+          <p:nvPr/>
+        </p:nvSpPr>
+        <p:spPr>
+          <a:xfrm>
+            <a:off x="0" y="2207436"/>
+            <a:ext cx="9144000" cy="830997"/>
+          </a:xfrm>
+          <a:prstGeom prst="rect">
+            <a:avLst/>
+          </a:prstGeom>
+          <a:noFill/>
+        </p:spPr>
+        <p:txBody>
+          <a:bodyPr wrap="square" rtlCol="0">
+            <a:spAutoFit/>
+          </a:bodyPr>
+          <a:lstStyle/>
+          <a:p>
+            <a:pPr algn="ctr"/>
+            <a:r>
+              <a:rPr lang="es-ES" sz="4800" dirty="0" err="1" smtClean="0"/>
+              <a:t>help</a:t>
+            </a:r>
+            <a:r>
+              <a:rPr lang="es-ES" sz="4800" dirty="0" smtClean="0"/>
+              <a:t>!</a:t>
+            </a:r>
+            <a:endParaRPr lang="ca-ES" sz="4800" dirty="0"/>
           </a:p>
         </p:txBody>
       </p:sp>
     </p:spTree>
     <p:extLst>
       <p:ext uri="{BB962C8B-B14F-4D97-AF65-F5344CB8AC3E}">
-        <p14:creationId xmlns:p14="http://schemas.microsoft.com/office/powerpoint/2010/main" val="2638868203"/>
+        <p14:creationId xmlns:p14="http://schemas.microsoft.com/office/powerpoint/2010/main" val="1985451205"/>
+      </p:ext>
+    </p:extLst>
+  </p:cSld>
+  <p:clrMapOvr>
+    <a:masterClrMapping/>
+  </p:clrMapOvr>
+  <p:timing>
+    <p:tnLst>
+      <p:par>
+        <p:cTn id="1" dur="indefinite" restart="never" nodeType="tmRoot"/>
+      </p:par>
+    </p:tnLst>
+  </p:timing>
+</p:sld>
+</file>
+
+<file path=ppt/slides/slide19.xml><?xml version="1.0" encoding="utf-8"?>
+<p:sld xmlns:a="http://schemas.openxmlformats.org/drawingml/2006/main" xmlns:r="http://schemas.openxmlformats.org/officeDocument/2006/relationships" xmlns:p="http://schemas.openxmlformats.org/presentationml/2006/main">
+  <p:cSld>
+    <p:spTree>
+      <p:nvGrpSpPr>
+        <p:cNvPr id="1" name=""/>
+        <p:cNvGrpSpPr/>
+        <p:nvPr/>
+      </p:nvGrpSpPr>
+      <p:grpSpPr>
+        <a:xfrm>
+          <a:off x="0" y="0"/>
+          <a:ext cx="0" cy="0"/>
+          <a:chOff x="0" y="0"/>
+          <a:chExt cx="0" cy="0"/>
+        </a:xfrm>
+      </p:grpSpPr>
+      <p:sp>
+        <p:nvSpPr>
+          <p:cNvPr id="4" name="3 CuadroTexto"/>
+          <p:cNvSpPr txBox="1"/>
+          <p:nvPr/>
+        </p:nvSpPr>
+        <p:spPr>
+          <a:xfrm>
+            <a:off x="0" y="404664"/>
+            <a:ext cx="9144000" cy="830997"/>
+          </a:xfrm>
+          <a:prstGeom prst="rect">
+            <a:avLst/>
+          </a:prstGeom>
+          <a:noFill/>
+        </p:spPr>
+        <p:txBody>
+          <a:bodyPr wrap="square" rtlCol="0">
+            <a:spAutoFit/>
+          </a:bodyPr>
+          <a:lstStyle/>
+          <a:p>
+            <a:pPr algn="ctr"/>
+            <a:r>
+              <a:rPr lang="es-ES" sz="4800" dirty="0" smtClean="0">
+                <a:solidFill>
+                  <a:schemeClr val="bg1">
+                    <a:lumMod val="50000"/>
+                    <a:lumOff val="50000"/>
+                  </a:schemeClr>
+                </a:solidFill>
+              </a:rPr>
+              <a:t>GIT</a:t>
+            </a:r>
+            <a:r>
+              <a:rPr lang="es-ES" sz="4800" dirty="0" smtClean="0"/>
+              <a:t> </a:t>
+            </a:r>
+            <a:r>
+              <a:rPr lang="es-ES" sz="4800" dirty="0" err="1" smtClean="0"/>
+              <a:t>commands</a:t>
+            </a:r>
+            <a:endParaRPr lang="ca-ES" sz="4800" dirty="0"/>
+          </a:p>
+        </p:txBody>
+      </p:sp>
+      <p:sp>
+        <p:nvSpPr>
+          <p:cNvPr id="2" name="1 Rectángulo"/>
+          <p:cNvSpPr/>
+          <p:nvPr/>
+        </p:nvSpPr>
+        <p:spPr>
+          <a:xfrm>
+            <a:off x="2465120" y="6488668"/>
+            <a:ext cx="6678880" cy="369332"/>
+          </a:xfrm>
+          <a:prstGeom prst="rect">
+            <a:avLst/>
+          </a:prstGeom>
+        </p:spPr>
+        <p:txBody>
+          <a:bodyPr wrap="none">
+            <a:spAutoFit/>
+          </a:bodyPr>
+          <a:lstStyle/>
+          <a:p>
+            <a:r>
+              <a:rPr lang="ca-ES" dirty="0">
+                <a:solidFill>
+                  <a:schemeClr val="bg1">
+                    <a:lumMod val="50000"/>
+                    <a:lumOff val="50000"/>
+                  </a:schemeClr>
+                </a:solidFill>
+              </a:rPr>
+              <a:t>https://git-scm.com/book/id/v2/Git-Basics-Getting-a-Git-Repository</a:t>
+            </a:r>
+            <a:endParaRPr lang="ca-ES" dirty="0">
+              <a:solidFill>
+                <a:schemeClr val="bg1">
+                  <a:lumMod val="50000"/>
+                  <a:lumOff val="50000"/>
+                </a:schemeClr>
+              </a:solidFill>
+            </a:endParaRPr>
+          </a:p>
+        </p:txBody>
+      </p:sp>
+      <p:sp>
+        <p:nvSpPr>
+          <p:cNvPr id="3" name="2 Rectángulo"/>
+          <p:cNvSpPr/>
+          <p:nvPr/>
+        </p:nvSpPr>
+        <p:spPr>
+          <a:xfrm>
+            <a:off x="0" y="3212976"/>
+            <a:ext cx="9144000" cy="523220"/>
+          </a:xfrm>
+          <a:prstGeom prst="rect">
+            <a:avLst/>
+          </a:prstGeom>
+        </p:spPr>
+        <p:txBody>
+          <a:bodyPr wrap="square">
+            <a:spAutoFit/>
+          </a:bodyPr>
+          <a:lstStyle/>
+          <a:p>
+            <a:pPr algn="ctr"/>
+            <a:r>
+              <a:rPr lang="es-ES" sz="2800" dirty="0" err="1" smtClean="0"/>
+              <a:t>git</a:t>
+            </a:r>
+            <a:r>
+              <a:rPr lang="es-ES" sz="2800" dirty="0" smtClean="0"/>
+              <a:t> </a:t>
+            </a:r>
+            <a:r>
+              <a:rPr lang="es-ES" sz="2800" dirty="0" err="1" smtClean="0"/>
+              <a:t>init</a:t>
+            </a:r>
+            <a:endParaRPr lang="es-ES" sz="2800" dirty="0" smtClean="0"/>
+          </a:p>
+        </p:txBody>
+      </p:sp>
+      <p:sp>
+        <p:nvSpPr>
+          <p:cNvPr id="6" name="5 CuadroTexto"/>
+          <p:cNvSpPr txBox="1"/>
+          <p:nvPr/>
+        </p:nvSpPr>
+        <p:spPr>
+          <a:xfrm>
+            <a:off x="0" y="2207436"/>
+            <a:ext cx="9144000" cy="830997"/>
+          </a:xfrm>
+          <a:prstGeom prst="rect">
+            <a:avLst/>
+          </a:prstGeom>
+          <a:noFill/>
+        </p:spPr>
+        <p:txBody>
+          <a:bodyPr wrap="square" rtlCol="0">
+            <a:spAutoFit/>
+          </a:bodyPr>
+          <a:lstStyle/>
+          <a:p>
+            <a:pPr algn="ctr"/>
+            <a:r>
+              <a:rPr lang="es-ES" sz="4800" dirty="0" err="1" smtClean="0"/>
+              <a:t>create</a:t>
+            </a:r>
+            <a:r>
+              <a:rPr lang="es-ES" sz="4800" dirty="0" smtClean="0"/>
+              <a:t> a </a:t>
+            </a:r>
+            <a:r>
+              <a:rPr lang="es-ES" sz="4800" dirty="0" err="1" smtClean="0"/>
+              <a:t>repository</a:t>
+            </a:r>
+            <a:endParaRPr lang="ca-ES" sz="4800" dirty="0"/>
+          </a:p>
+        </p:txBody>
+      </p:sp>
+    </p:spTree>
+    <p:extLst>
+      <p:ext uri="{BB962C8B-B14F-4D97-AF65-F5344CB8AC3E}">
+        <p14:creationId xmlns:p14="http://schemas.microsoft.com/office/powerpoint/2010/main" val="2179585427"/>
       </p:ext>
     </p:extLst>
   </p:cSld>
@@ -5718,6 +6038,1116 @@
     <p:extLst>
       <p:ext uri="{BB962C8B-B14F-4D97-AF65-F5344CB8AC3E}">
         <p14:creationId xmlns:p14="http://schemas.microsoft.com/office/powerpoint/2010/main" val="1765411047"/>
+      </p:ext>
+    </p:extLst>
+  </p:cSld>
+  <p:clrMapOvr>
+    <a:masterClrMapping/>
+  </p:clrMapOvr>
+  <p:timing>
+    <p:tnLst>
+      <p:par>
+        <p:cTn id="1" dur="indefinite" restart="never" nodeType="tmRoot"/>
+      </p:par>
+    </p:tnLst>
+  </p:timing>
+</p:sld>
+</file>
+
+<file path=ppt/slides/slide20.xml><?xml version="1.0" encoding="utf-8"?>
+<p:sld xmlns:a="http://schemas.openxmlformats.org/drawingml/2006/main" xmlns:r="http://schemas.openxmlformats.org/officeDocument/2006/relationships" xmlns:p="http://schemas.openxmlformats.org/presentationml/2006/main">
+  <p:cSld>
+    <p:spTree>
+      <p:nvGrpSpPr>
+        <p:cNvPr id="1" name=""/>
+        <p:cNvGrpSpPr/>
+        <p:nvPr/>
+      </p:nvGrpSpPr>
+      <p:grpSpPr>
+        <a:xfrm>
+          <a:off x="0" y="0"/>
+          <a:ext cx="0" cy="0"/>
+          <a:chOff x="0" y="0"/>
+          <a:chExt cx="0" cy="0"/>
+        </a:xfrm>
+      </p:grpSpPr>
+      <p:sp>
+        <p:nvSpPr>
+          <p:cNvPr id="4" name="3 CuadroTexto"/>
+          <p:cNvSpPr txBox="1"/>
+          <p:nvPr/>
+        </p:nvSpPr>
+        <p:spPr>
+          <a:xfrm>
+            <a:off x="0" y="404664"/>
+            <a:ext cx="9144000" cy="830997"/>
+          </a:xfrm>
+          <a:prstGeom prst="rect">
+            <a:avLst/>
+          </a:prstGeom>
+          <a:noFill/>
+        </p:spPr>
+        <p:txBody>
+          <a:bodyPr wrap="square" rtlCol="0">
+            <a:spAutoFit/>
+          </a:bodyPr>
+          <a:lstStyle/>
+          <a:p>
+            <a:pPr algn="ctr"/>
+            <a:r>
+              <a:rPr lang="es-ES" sz="4800" dirty="0" smtClean="0">
+                <a:solidFill>
+                  <a:schemeClr val="bg1">
+                    <a:lumMod val="50000"/>
+                    <a:lumOff val="50000"/>
+                  </a:schemeClr>
+                </a:solidFill>
+              </a:rPr>
+              <a:t>GIT</a:t>
+            </a:r>
+            <a:r>
+              <a:rPr lang="es-ES" sz="4800" dirty="0" smtClean="0"/>
+              <a:t> </a:t>
+            </a:r>
+            <a:r>
+              <a:rPr lang="es-ES" sz="4800" dirty="0" err="1" smtClean="0"/>
+              <a:t>commands</a:t>
+            </a:r>
+            <a:endParaRPr lang="ca-ES" sz="4800" dirty="0"/>
+          </a:p>
+        </p:txBody>
+      </p:sp>
+      <p:sp>
+        <p:nvSpPr>
+          <p:cNvPr id="3" name="2 Rectángulo"/>
+          <p:cNvSpPr/>
+          <p:nvPr/>
+        </p:nvSpPr>
+        <p:spPr>
+          <a:xfrm>
+            <a:off x="0" y="3212976"/>
+            <a:ext cx="9144000" cy="1384995"/>
+          </a:xfrm>
+          <a:prstGeom prst="rect">
+            <a:avLst/>
+          </a:prstGeom>
+        </p:spPr>
+        <p:txBody>
+          <a:bodyPr wrap="square">
+            <a:spAutoFit/>
+          </a:bodyPr>
+          <a:lstStyle/>
+          <a:p>
+            <a:pPr algn="ctr"/>
+            <a:r>
+              <a:rPr lang="es-ES" sz="2800" dirty="0" err="1"/>
+              <a:t>git</a:t>
+            </a:r>
+            <a:r>
+              <a:rPr lang="es-ES" sz="2800" dirty="0"/>
+              <a:t> </a:t>
+            </a:r>
+            <a:r>
+              <a:rPr lang="es-ES" sz="2800" dirty="0" err="1"/>
+              <a:t>add</a:t>
+            </a:r>
+            <a:r>
+              <a:rPr lang="es-ES" sz="2800" dirty="0"/>
+              <a:t> </a:t>
+            </a:r>
+            <a:r>
+              <a:rPr lang="es-ES" sz="2800" dirty="0" smtClean="0"/>
+              <a:t>Main.java</a:t>
+            </a:r>
+          </a:p>
+          <a:p>
+            <a:pPr algn="ctr"/>
+            <a:r>
+              <a:rPr lang="es-ES" sz="2800" dirty="0" err="1" smtClean="0"/>
+              <a:t>git</a:t>
+            </a:r>
+            <a:r>
+              <a:rPr lang="es-ES" sz="2800" dirty="0" smtClean="0"/>
+              <a:t> </a:t>
+            </a:r>
+            <a:r>
+              <a:rPr lang="es-ES" sz="2800" dirty="0" err="1" smtClean="0"/>
+              <a:t>add</a:t>
+            </a:r>
+            <a:r>
+              <a:rPr lang="es-ES" sz="2800" dirty="0" smtClean="0"/>
+              <a:t> *.java</a:t>
+            </a:r>
+          </a:p>
+          <a:p>
+            <a:pPr algn="ctr"/>
+            <a:r>
+              <a:rPr lang="es-ES" sz="2800" dirty="0" err="1"/>
+              <a:t>git</a:t>
+            </a:r>
+            <a:r>
+              <a:rPr lang="es-ES" sz="2800" dirty="0"/>
+              <a:t> </a:t>
+            </a:r>
+            <a:r>
+              <a:rPr lang="es-ES" sz="2800" dirty="0" err="1"/>
+              <a:t>add</a:t>
+            </a:r>
+            <a:r>
+              <a:rPr lang="es-ES" sz="2800" dirty="0"/>
+              <a:t> *.</a:t>
+            </a:r>
+            <a:r>
+              <a:rPr lang="es-ES" sz="2800" dirty="0" smtClean="0"/>
+              <a:t>java</a:t>
+            </a:r>
+            <a:endParaRPr lang="es-ES" sz="2800" dirty="0"/>
+          </a:p>
+        </p:txBody>
+      </p:sp>
+      <p:sp>
+        <p:nvSpPr>
+          <p:cNvPr id="6" name="5 CuadroTexto"/>
+          <p:cNvSpPr txBox="1"/>
+          <p:nvPr/>
+        </p:nvSpPr>
+        <p:spPr>
+          <a:xfrm>
+            <a:off x="0" y="2207436"/>
+            <a:ext cx="9144000" cy="830997"/>
+          </a:xfrm>
+          <a:prstGeom prst="rect">
+            <a:avLst/>
+          </a:prstGeom>
+          <a:noFill/>
+        </p:spPr>
+        <p:txBody>
+          <a:bodyPr wrap="square" rtlCol="0">
+            <a:spAutoFit/>
+          </a:bodyPr>
+          <a:lstStyle/>
+          <a:p>
+            <a:pPr algn="ctr"/>
+            <a:r>
+              <a:rPr lang="es-ES" sz="4800" dirty="0" err="1" smtClean="0"/>
+              <a:t>add</a:t>
+            </a:r>
+            <a:r>
+              <a:rPr lang="es-ES" sz="4800" dirty="0" smtClean="0"/>
+              <a:t> files</a:t>
+            </a:r>
+            <a:endParaRPr lang="ca-ES" sz="4800" dirty="0"/>
+          </a:p>
+        </p:txBody>
+      </p:sp>
+      <p:sp>
+        <p:nvSpPr>
+          <p:cNvPr id="7" name="6 Rectángulo"/>
+          <p:cNvSpPr/>
+          <p:nvPr/>
+        </p:nvSpPr>
+        <p:spPr>
+          <a:xfrm>
+            <a:off x="2645648" y="6488668"/>
+            <a:ext cx="6678880" cy="369332"/>
+          </a:xfrm>
+          <a:prstGeom prst="rect">
+            <a:avLst/>
+          </a:prstGeom>
+        </p:spPr>
+        <p:txBody>
+          <a:bodyPr wrap="none">
+            <a:spAutoFit/>
+          </a:bodyPr>
+          <a:lstStyle/>
+          <a:p>
+            <a:r>
+              <a:rPr lang="ca-ES" dirty="0">
+                <a:solidFill>
+                  <a:schemeClr val="bg1">
+                    <a:lumMod val="50000"/>
+                    <a:lumOff val="50000"/>
+                  </a:schemeClr>
+                </a:solidFill>
+              </a:rPr>
+              <a:t>https://git-scm.com/book/id/v2/Git-Basics-Getting-a-Git-Repository</a:t>
+            </a:r>
+            <a:endParaRPr lang="ca-ES" dirty="0">
+              <a:solidFill>
+                <a:schemeClr val="bg1">
+                  <a:lumMod val="50000"/>
+                  <a:lumOff val="50000"/>
+                </a:schemeClr>
+              </a:solidFill>
+            </a:endParaRPr>
+          </a:p>
+        </p:txBody>
+      </p:sp>
+    </p:spTree>
+    <p:extLst>
+      <p:ext uri="{BB962C8B-B14F-4D97-AF65-F5344CB8AC3E}">
+        <p14:creationId xmlns:p14="http://schemas.microsoft.com/office/powerpoint/2010/main" val="80230748"/>
+      </p:ext>
+    </p:extLst>
+  </p:cSld>
+  <p:clrMapOvr>
+    <a:masterClrMapping/>
+  </p:clrMapOvr>
+  <p:timing>
+    <p:tnLst>
+      <p:par>
+        <p:cTn id="1" dur="indefinite" restart="never" nodeType="tmRoot"/>
+      </p:par>
+    </p:tnLst>
+  </p:timing>
+</p:sld>
+</file>
+
+<file path=ppt/slides/slide21.xml><?xml version="1.0" encoding="utf-8"?>
+<p:sld xmlns:a="http://schemas.openxmlformats.org/drawingml/2006/main" xmlns:r="http://schemas.openxmlformats.org/officeDocument/2006/relationships" xmlns:p="http://schemas.openxmlformats.org/presentationml/2006/main">
+  <p:cSld>
+    <p:spTree>
+      <p:nvGrpSpPr>
+        <p:cNvPr id="1" name=""/>
+        <p:cNvGrpSpPr/>
+        <p:nvPr/>
+      </p:nvGrpSpPr>
+      <p:grpSpPr>
+        <a:xfrm>
+          <a:off x="0" y="0"/>
+          <a:ext cx="0" cy="0"/>
+          <a:chOff x="0" y="0"/>
+          <a:chExt cx="0" cy="0"/>
+        </a:xfrm>
+      </p:grpSpPr>
+      <p:sp>
+        <p:nvSpPr>
+          <p:cNvPr id="4" name="3 CuadroTexto"/>
+          <p:cNvSpPr txBox="1"/>
+          <p:nvPr/>
+        </p:nvSpPr>
+        <p:spPr>
+          <a:xfrm>
+            <a:off x="0" y="404664"/>
+            <a:ext cx="9144000" cy="830997"/>
+          </a:xfrm>
+          <a:prstGeom prst="rect">
+            <a:avLst/>
+          </a:prstGeom>
+          <a:noFill/>
+        </p:spPr>
+        <p:txBody>
+          <a:bodyPr wrap="square" rtlCol="0">
+            <a:spAutoFit/>
+          </a:bodyPr>
+          <a:lstStyle/>
+          <a:p>
+            <a:pPr algn="ctr"/>
+            <a:r>
+              <a:rPr lang="es-ES" sz="4800" dirty="0" smtClean="0">
+                <a:solidFill>
+                  <a:schemeClr val="bg1">
+                    <a:lumMod val="50000"/>
+                    <a:lumOff val="50000"/>
+                  </a:schemeClr>
+                </a:solidFill>
+              </a:rPr>
+              <a:t>GIT</a:t>
+            </a:r>
+            <a:r>
+              <a:rPr lang="es-ES" sz="4800" dirty="0" smtClean="0"/>
+              <a:t> </a:t>
+            </a:r>
+            <a:r>
+              <a:rPr lang="es-ES" sz="4800" dirty="0" err="1" smtClean="0"/>
+              <a:t>commands</a:t>
+            </a:r>
+            <a:endParaRPr lang="ca-ES" sz="4800" dirty="0"/>
+          </a:p>
+        </p:txBody>
+      </p:sp>
+      <p:sp>
+        <p:nvSpPr>
+          <p:cNvPr id="2" name="1 Rectángulo"/>
+          <p:cNvSpPr/>
+          <p:nvPr/>
+        </p:nvSpPr>
+        <p:spPr>
+          <a:xfrm>
+            <a:off x="2645648" y="6488668"/>
+            <a:ext cx="6678880" cy="369332"/>
+          </a:xfrm>
+          <a:prstGeom prst="rect">
+            <a:avLst/>
+          </a:prstGeom>
+        </p:spPr>
+        <p:txBody>
+          <a:bodyPr wrap="none">
+            <a:spAutoFit/>
+          </a:bodyPr>
+          <a:lstStyle/>
+          <a:p>
+            <a:r>
+              <a:rPr lang="ca-ES" dirty="0">
+                <a:solidFill>
+                  <a:schemeClr val="bg1">
+                    <a:lumMod val="50000"/>
+                    <a:lumOff val="50000"/>
+                  </a:schemeClr>
+                </a:solidFill>
+              </a:rPr>
+              <a:t>https://git-scm.com/book/id/v2/Git-Basics-Getting-a-Git-Repository</a:t>
+            </a:r>
+            <a:endParaRPr lang="ca-ES" dirty="0">
+              <a:solidFill>
+                <a:schemeClr val="bg1">
+                  <a:lumMod val="50000"/>
+                  <a:lumOff val="50000"/>
+                </a:schemeClr>
+              </a:solidFill>
+            </a:endParaRPr>
+          </a:p>
+        </p:txBody>
+      </p:sp>
+      <p:sp>
+        <p:nvSpPr>
+          <p:cNvPr id="3" name="2 Rectángulo"/>
+          <p:cNvSpPr/>
+          <p:nvPr/>
+        </p:nvSpPr>
+        <p:spPr>
+          <a:xfrm>
+            <a:off x="0" y="3212976"/>
+            <a:ext cx="9144000" cy="954107"/>
+          </a:xfrm>
+          <a:prstGeom prst="rect">
+            <a:avLst/>
+          </a:prstGeom>
+        </p:spPr>
+        <p:txBody>
+          <a:bodyPr wrap="square">
+            <a:spAutoFit/>
+          </a:bodyPr>
+          <a:lstStyle/>
+          <a:p>
+            <a:pPr algn="ctr"/>
+            <a:r>
+              <a:rPr lang="es-ES" sz="2800" dirty="0" err="1"/>
+              <a:t>git</a:t>
+            </a:r>
+            <a:r>
+              <a:rPr lang="es-ES" sz="2800" dirty="0"/>
+              <a:t> </a:t>
+            </a:r>
+            <a:r>
+              <a:rPr lang="es-ES" sz="2800" dirty="0" err="1" smtClean="0"/>
+              <a:t>commit</a:t>
+            </a:r>
+            <a:r>
+              <a:rPr lang="es-ES" sz="2800" dirty="0" smtClean="0"/>
+              <a:t>        </a:t>
+            </a:r>
+            <a:r>
+              <a:rPr lang="es-ES" sz="2800" dirty="0" smtClean="0">
+                <a:solidFill>
+                  <a:schemeClr val="bg1">
+                    <a:lumMod val="50000"/>
+                    <a:lumOff val="50000"/>
+                  </a:schemeClr>
+                </a:solidFill>
+              </a:rPr>
+              <a:t>// </a:t>
+            </a:r>
+            <a:r>
+              <a:rPr lang="es-ES" sz="2800" dirty="0" err="1" smtClean="0">
+                <a:solidFill>
+                  <a:schemeClr val="bg1">
+                    <a:lumMod val="50000"/>
+                    <a:lumOff val="50000"/>
+                  </a:schemeClr>
+                </a:solidFill>
+              </a:rPr>
+              <a:t>will</a:t>
+            </a:r>
+            <a:r>
+              <a:rPr lang="es-ES" sz="2800" dirty="0" smtClean="0">
+                <a:solidFill>
+                  <a:schemeClr val="bg1">
+                    <a:lumMod val="50000"/>
+                    <a:lumOff val="50000"/>
+                  </a:schemeClr>
+                </a:solidFill>
+              </a:rPr>
+              <a:t> open </a:t>
+            </a:r>
+            <a:r>
+              <a:rPr lang="es-ES" sz="2800" dirty="0" err="1" smtClean="0">
+                <a:solidFill>
+                  <a:schemeClr val="bg1">
+                    <a:lumMod val="50000"/>
+                    <a:lumOff val="50000"/>
+                  </a:schemeClr>
+                </a:solidFill>
+              </a:rPr>
+              <a:t>vim</a:t>
+            </a:r>
+            <a:endParaRPr lang="es-ES" sz="2800" dirty="0">
+              <a:solidFill>
+                <a:schemeClr val="bg1">
+                  <a:lumMod val="50000"/>
+                  <a:lumOff val="50000"/>
+                </a:schemeClr>
+              </a:solidFill>
+            </a:endParaRPr>
+          </a:p>
+          <a:p>
+            <a:pPr algn="ctr"/>
+            <a:r>
+              <a:rPr lang="es-ES" sz="2800" dirty="0" err="1"/>
+              <a:t>git</a:t>
+            </a:r>
+            <a:r>
+              <a:rPr lang="es-ES" sz="2800" dirty="0"/>
+              <a:t> </a:t>
+            </a:r>
+            <a:r>
+              <a:rPr lang="es-ES" sz="2800" dirty="0" err="1" smtClean="0"/>
+              <a:t>commit</a:t>
+            </a:r>
+            <a:r>
+              <a:rPr lang="es-ES" sz="2800" dirty="0"/>
+              <a:t> </a:t>
+            </a:r>
+            <a:r>
+              <a:rPr lang="es-ES" sz="2800" dirty="0" smtClean="0"/>
+              <a:t>–m "</a:t>
+            </a:r>
+            <a:r>
+              <a:rPr lang="es-ES" sz="2800" dirty="0" err="1" smtClean="0"/>
+              <a:t>your</a:t>
+            </a:r>
+            <a:r>
+              <a:rPr lang="es-ES" sz="2800" dirty="0" smtClean="0"/>
+              <a:t> </a:t>
+            </a:r>
+            <a:r>
+              <a:rPr lang="es-ES" sz="2800" dirty="0" err="1" smtClean="0"/>
+              <a:t>message</a:t>
+            </a:r>
+            <a:r>
+              <a:rPr lang="es-ES" sz="2800" dirty="0" smtClean="0"/>
+              <a:t>"</a:t>
+            </a:r>
+            <a:endParaRPr lang="es-ES" sz="2800" dirty="0"/>
+          </a:p>
+        </p:txBody>
+      </p:sp>
+      <p:sp>
+        <p:nvSpPr>
+          <p:cNvPr id="6" name="5 CuadroTexto"/>
+          <p:cNvSpPr txBox="1"/>
+          <p:nvPr/>
+        </p:nvSpPr>
+        <p:spPr>
+          <a:xfrm>
+            <a:off x="0" y="2207436"/>
+            <a:ext cx="9144000" cy="830997"/>
+          </a:xfrm>
+          <a:prstGeom prst="rect">
+            <a:avLst/>
+          </a:prstGeom>
+          <a:noFill/>
+        </p:spPr>
+        <p:txBody>
+          <a:bodyPr wrap="square" rtlCol="0">
+            <a:spAutoFit/>
+          </a:bodyPr>
+          <a:lstStyle/>
+          <a:p>
+            <a:pPr algn="ctr"/>
+            <a:r>
+              <a:rPr lang="es-ES" sz="4800" dirty="0" err="1" smtClean="0"/>
+              <a:t>commit</a:t>
+            </a:r>
+            <a:r>
+              <a:rPr lang="es-ES" sz="4800" dirty="0" smtClean="0"/>
+              <a:t> </a:t>
+            </a:r>
+            <a:r>
+              <a:rPr lang="es-ES" sz="4800" dirty="0" err="1" smtClean="0"/>
+              <a:t>changes</a:t>
+            </a:r>
+            <a:endParaRPr lang="ca-ES" sz="4800" dirty="0"/>
+          </a:p>
+        </p:txBody>
+      </p:sp>
+    </p:spTree>
+    <p:extLst>
+      <p:ext uri="{BB962C8B-B14F-4D97-AF65-F5344CB8AC3E}">
+        <p14:creationId xmlns:p14="http://schemas.microsoft.com/office/powerpoint/2010/main" val="1413597977"/>
+      </p:ext>
+    </p:extLst>
+  </p:cSld>
+  <p:clrMapOvr>
+    <a:masterClrMapping/>
+  </p:clrMapOvr>
+  <p:timing>
+    <p:tnLst>
+      <p:par>
+        <p:cTn id="1" dur="indefinite" restart="never" nodeType="tmRoot"/>
+      </p:par>
+    </p:tnLst>
+  </p:timing>
+</p:sld>
+</file>
+
+<file path=ppt/slides/slide22.xml><?xml version="1.0" encoding="utf-8"?>
+<p:sld xmlns:a="http://schemas.openxmlformats.org/drawingml/2006/main" xmlns:r="http://schemas.openxmlformats.org/officeDocument/2006/relationships" xmlns:p="http://schemas.openxmlformats.org/presentationml/2006/main">
+  <p:cSld>
+    <p:spTree>
+      <p:nvGrpSpPr>
+        <p:cNvPr id="1" name=""/>
+        <p:cNvGrpSpPr/>
+        <p:nvPr/>
+      </p:nvGrpSpPr>
+      <p:grpSpPr>
+        <a:xfrm>
+          <a:off x="0" y="0"/>
+          <a:ext cx="0" cy="0"/>
+          <a:chOff x="0" y="0"/>
+          <a:chExt cx="0" cy="0"/>
+        </a:xfrm>
+      </p:grpSpPr>
+      <p:sp>
+        <p:nvSpPr>
+          <p:cNvPr id="4" name="3 CuadroTexto"/>
+          <p:cNvSpPr txBox="1"/>
+          <p:nvPr/>
+        </p:nvSpPr>
+        <p:spPr>
+          <a:xfrm>
+            <a:off x="0" y="404664"/>
+            <a:ext cx="9144000" cy="830997"/>
+          </a:xfrm>
+          <a:prstGeom prst="rect">
+            <a:avLst/>
+          </a:prstGeom>
+          <a:noFill/>
+        </p:spPr>
+        <p:txBody>
+          <a:bodyPr wrap="square" rtlCol="0">
+            <a:spAutoFit/>
+          </a:bodyPr>
+          <a:lstStyle/>
+          <a:p>
+            <a:pPr algn="ctr"/>
+            <a:r>
+              <a:rPr lang="es-ES" sz="4800" dirty="0" smtClean="0">
+                <a:solidFill>
+                  <a:schemeClr val="bg1">
+                    <a:lumMod val="50000"/>
+                    <a:lumOff val="50000"/>
+                  </a:schemeClr>
+                </a:solidFill>
+              </a:rPr>
+              <a:t>GIT</a:t>
+            </a:r>
+            <a:r>
+              <a:rPr lang="es-ES" sz="4800" dirty="0" smtClean="0"/>
+              <a:t> </a:t>
+            </a:r>
+            <a:r>
+              <a:rPr lang="es-ES" sz="4800" dirty="0" err="1" smtClean="0"/>
+              <a:t>commands</a:t>
+            </a:r>
+            <a:endParaRPr lang="ca-ES" sz="4800" dirty="0"/>
+          </a:p>
+        </p:txBody>
+      </p:sp>
+      <p:sp>
+        <p:nvSpPr>
+          <p:cNvPr id="2" name="1 Rectángulo"/>
+          <p:cNvSpPr/>
+          <p:nvPr/>
+        </p:nvSpPr>
+        <p:spPr>
+          <a:xfrm>
+            <a:off x="1404409" y="6488668"/>
+            <a:ext cx="7776103" cy="369332"/>
+          </a:xfrm>
+          <a:prstGeom prst="rect">
+            <a:avLst/>
+          </a:prstGeom>
+        </p:spPr>
+        <p:txBody>
+          <a:bodyPr wrap="none">
+            <a:spAutoFit/>
+          </a:bodyPr>
+          <a:lstStyle/>
+          <a:p>
+            <a:r>
+              <a:rPr lang="ca-ES" dirty="0">
+                <a:solidFill>
+                  <a:schemeClr val="bg1">
+                    <a:lumMod val="50000"/>
+                    <a:lumOff val="50000"/>
+                  </a:schemeClr>
+                </a:solidFill>
+              </a:rPr>
+              <a:t>https://git-scm.com/book/id/v2/Git-Basics-Recording-Changes-to-the-Repository</a:t>
+            </a:r>
+            <a:endParaRPr lang="ca-ES" dirty="0">
+              <a:solidFill>
+                <a:schemeClr val="bg1">
+                  <a:lumMod val="50000"/>
+                  <a:lumOff val="50000"/>
+                </a:schemeClr>
+              </a:solidFill>
+            </a:endParaRPr>
+          </a:p>
+        </p:txBody>
+      </p:sp>
+      <p:pic>
+        <p:nvPicPr>
+          <p:cNvPr id="1026" name="Picture 2" descr="C:\Users\Roc Boronat\Desktop\lifecycle.png"/>
+          <p:cNvPicPr>
+            <a:picLocks noChangeAspect="1" noChangeArrowheads="1"/>
+          </p:cNvPicPr>
+          <p:nvPr/>
+        </p:nvPicPr>
+        <p:blipFill>
+          <a:blip r:embed="rId2">
+            <a:extLst>
+              <a:ext uri="{28A0092B-C50C-407E-A947-70E740481C1C}">
+                <a14:useLocalDpi xmlns:a14="http://schemas.microsoft.com/office/drawing/2010/main" val="0"/>
+              </a:ext>
+            </a:extLst>
+          </a:blip>
+          <a:srcRect/>
+          <a:stretch>
+            <a:fillRect/>
+          </a:stretch>
+        </p:blipFill>
+        <p:spPr bwMode="auto">
+          <a:xfrm>
+            <a:off x="762000" y="2132856"/>
+            <a:ext cx="7620000" cy="3143250"/>
+          </a:xfrm>
+          <a:prstGeom prst="rect">
+            <a:avLst/>
+          </a:prstGeom>
+          <a:noFill/>
+          <a:extLst>
+            <a:ext uri="{909E8E84-426E-40DD-AFC4-6F175D3DCCD1}">
+              <a14:hiddenFill xmlns:a14="http://schemas.microsoft.com/office/drawing/2010/main">
+                <a:solidFill>
+                  <a:srgbClr val="FFFFFF"/>
+                </a:solidFill>
+              </a14:hiddenFill>
+            </a:ext>
+          </a:extLst>
+        </p:spPr>
+      </p:pic>
+    </p:spTree>
+    <p:extLst>
+      <p:ext uri="{BB962C8B-B14F-4D97-AF65-F5344CB8AC3E}">
+        <p14:creationId xmlns:p14="http://schemas.microsoft.com/office/powerpoint/2010/main" val="527244493"/>
+      </p:ext>
+    </p:extLst>
+  </p:cSld>
+  <p:clrMapOvr>
+    <a:masterClrMapping/>
+  </p:clrMapOvr>
+  <p:timing>
+    <p:tnLst>
+      <p:par>
+        <p:cTn id="1" dur="indefinite" restart="never" nodeType="tmRoot"/>
+      </p:par>
+    </p:tnLst>
+  </p:timing>
+</p:sld>
+</file>
+
+<file path=ppt/slides/slide23.xml><?xml version="1.0" encoding="utf-8"?>
+<p:sld xmlns:a="http://schemas.openxmlformats.org/drawingml/2006/main" xmlns:r="http://schemas.openxmlformats.org/officeDocument/2006/relationships" xmlns:p="http://schemas.openxmlformats.org/presentationml/2006/main">
+  <p:cSld>
+    <p:spTree>
+      <p:nvGrpSpPr>
+        <p:cNvPr id="1" name=""/>
+        <p:cNvGrpSpPr/>
+        <p:nvPr/>
+      </p:nvGrpSpPr>
+      <p:grpSpPr>
+        <a:xfrm>
+          <a:off x="0" y="0"/>
+          <a:ext cx="0" cy="0"/>
+          <a:chOff x="0" y="0"/>
+          <a:chExt cx="0" cy="0"/>
+        </a:xfrm>
+      </p:grpSpPr>
+      <p:sp>
+        <p:nvSpPr>
+          <p:cNvPr id="4" name="3 CuadroTexto"/>
+          <p:cNvSpPr txBox="1"/>
+          <p:nvPr/>
+        </p:nvSpPr>
+        <p:spPr>
+          <a:xfrm>
+            <a:off x="0" y="404664"/>
+            <a:ext cx="9144000" cy="830997"/>
+          </a:xfrm>
+          <a:prstGeom prst="rect">
+            <a:avLst/>
+          </a:prstGeom>
+          <a:noFill/>
+        </p:spPr>
+        <p:txBody>
+          <a:bodyPr wrap="square" rtlCol="0">
+            <a:spAutoFit/>
+          </a:bodyPr>
+          <a:lstStyle/>
+          <a:p>
+            <a:pPr algn="ctr"/>
+            <a:r>
+              <a:rPr lang="es-ES" sz="4800" dirty="0" smtClean="0">
+                <a:solidFill>
+                  <a:schemeClr val="bg1">
+                    <a:lumMod val="50000"/>
+                    <a:lumOff val="50000"/>
+                  </a:schemeClr>
+                </a:solidFill>
+              </a:rPr>
+              <a:t>GIT</a:t>
+            </a:r>
+            <a:r>
+              <a:rPr lang="es-ES" sz="4800" dirty="0" smtClean="0"/>
+              <a:t> </a:t>
+            </a:r>
+            <a:r>
+              <a:rPr lang="es-ES" sz="4800" dirty="0" err="1" smtClean="0"/>
+              <a:t>glossary</a:t>
+            </a:r>
+            <a:endParaRPr lang="ca-ES" sz="4800" dirty="0"/>
+          </a:p>
+        </p:txBody>
+      </p:sp>
+      <p:sp>
+        <p:nvSpPr>
+          <p:cNvPr id="22" name="21 CuadroTexto"/>
+          <p:cNvSpPr txBox="1"/>
+          <p:nvPr/>
+        </p:nvSpPr>
+        <p:spPr>
+          <a:xfrm>
+            <a:off x="0" y="2207436"/>
+            <a:ext cx="9144000" cy="830997"/>
+          </a:xfrm>
+          <a:prstGeom prst="rect">
+            <a:avLst/>
+          </a:prstGeom>
+          <a:noFill/>
+        </p:spPr>
+        <p:txBody>
+          <a:bodyPr wrap="square" rtlCol="0">
+            <a:spAutoFit/>
+          </a:bodyPr>
+          <a:lstStyle/>
+          <a:p>
+            <a:pPr algn="ctr"/>
+            <a:r>
+              <a:rPr lang="es-ES" sz="4800" dirty="0" err="1" smtClean="0"/>
+              <a:t>pull</a:t>
+            </a:r>
+            <a:endParaRPr lang="ca-ES" sz="4800" dirty="0"/>
+          </a:p>
+        </p:txBody>
+      </p:sp>
+      <p:sp>
+        <p:nvSpPr>
+          <p:cNvPr id="2" name="1 Rectángulo"/>
+          <p:cNvSpPr/>
+          <p:nvPr/>
+        </p:nvSpPr>
+        <p:spPr>
+          <a:xfrm>
+            <a:off x="5494475" y="6488668"/>
+            <a:ext cx="3649525" cy="369332"/>
+          </a:xfrm>
+          <a:prstGeom prst="rect">
+            <a:avLst/>
+          </a:prstGeom>
+        </p:spPr>
+        <p:txBody>
+          <a:bodyPr wrap="none">
+            <a:spAutoFit/>
+          </a:bodyPr>
+          <a:lstStyle/>
+          <a:p>
+            <a:r>
+              <a:rPr lang="ca-ES" dirty="0" smtClean="0">
+                <a:solidFill>
+                  <a:schemeClr val="bg1">
+                    <a:lumMod val="50000"/>
+                    <a:lumOff val="50000"/>
+                  </a:schemeClr>
+                </a:solidFill>
+              </a:rPr>
+              <a:t>https://git-scm.com/docs/gitglossary</a:t>
+            </a:r>
+            <a:endParaRPr lang="ca-ES" dirty="0">
+              <a:solidFill>
+                <a:schemeClr val="bg1">
+                  <a:lumMod val="50000"/>
+                  <a:lumOff val="50000"/>
+                </a:schemeClr>
+              </a:solidFill>
+            </a:endParaRPr>
+          </a:p>
+        </p:txBody>
+      </p:sp>
+      <p:sp>
+        <p:nvSpPr>
+          <p:cNvPr id="3" name="2 Rectángulo"/>
+          <p:cNvSpPr/>
+          <p:nvPr/>
+        </p:nvSpPr>
+        <p:spPr>
+          <a:xfrm>
+            <a:off x="1106615" y="3248610"/>
+            <a:ext cx="6930770" cy="523220"/>
+          </a:xfrm>
+          <a:prstGeom prst="rect">
+            <a:avLst/>
+          </a:prstGeom>
+        </p:spPr>
+        <p:txBody>
+          <a:bodyPr wrap="square">
+            <a:spAutoFit/>
+          </a:bodyPr>
+          <a:lstStyle/>
+          <a:p>
+            <a:pPr algn="ctr"/>
+            <a:r>
+              <a:rPr lang="en-US" sz="2800" dirty="0" smtClean="0"/>
+              <a:t>To</a:t>
+            </a:r>
+            <a:r>
+              <a:rPr lang="en-US" sz="2800" dirty="0"/>
+              <a:t> fetch </a:t>
+            </a:r>
+            <a:r>
+              <a:rPr lang="en-US" sz="2800" dirty="0" smtClean="0"/>
+              <a:t>a branch and</a:t>
+            </a:r>
+            <a:r>
+              <a:rPr lang="en-US" sz="2800" dirty="0"/>
+              <a:t> merge it.</a:t>
+            </a:r>
+            <a:endParaRPr lang="ca-ES" sz="2800" dirty="0"/>
+          </a:p>
+        </p:txBody>
+      </p:sp>
+    </p:spTree>
+    <p:extLst>
+      <p:ext uri="{BB962C8B-B14F-4D97-AF65-F5344CB8AC3E}">
+        <p14:creationId xmlns:p14="http://schemas.microsoft.com/office/powerpoint/2010/main" val="3345413051"/>
+      </p:ext>
+    </p:extLst>
+  </p:cSld>
+  <p:clrMapOvr>
+    <a:masterClrMapping/>
+  </p:clrMapOvr>
+  <p:timing>
+    <p:tnLst>
+      <p:par>
+        <p:cTn id="1" dur="indefinite" restart="never" nodeType="tmRoot"/>
+      </p:par>
+    </p:tnLst>
+  </p:timing>
+</p:sld>
+</file>
+
+<file path=ppt/slides/slide24.xml><?xml version="1.0" encoding="utf-8"?>
+<p:sld xmlns:a="http://schemas.openxmlformats.org/drawingml/2006/main" xmlns:r="http://schemas.openxmlformats.org/officeDocument/2006/relationships" xmlns:p="http://schemas.openxmlformats.org/presentationml/2006/main">
+  <p:cSld>
+    <p:spTree>
+      <p:nvGrpSpPr>
+        <p:cNvPr id="1" name=""/>
+        <p:cNvGrpSpPr/>
+        <p:nvPr/>
+      </p:nvGrpSpPr>
+      <p:grpSpPr>
+        <a:xfrm>
+          <a:off x="0" y="0"/>
+          <a:ext cx="0" cy="0"/>
+          <a:chOff x="0" y="0"/>
+          <a:chExt cx="0" cy="0"/>
+        </a:xfrm>
+      </p:grpSpPr>
+      <p:sp>
+        <p:nvSpPr>
+          <p:cNvPr id="4" name="3 CuadroTexto"/>
+          <p:cNvSpPr txBox="1"/>
+          <p:nvPr/>
+        </p:nvSpPr>
+        <p:spPr>
+          <a:xfrm>
+            <a:off x="0" y="404664"/>
+            <a:ext cx="9144000" cy="830997"/>
+          </a:xfrm>
+          <a:prstGeom prst="rect">
+            <a:avLst/>
+          </a:prstGeom>
+          <a:noFill/>
+        </p:spPr>
+        <p:txBody>
+          <a:bodyPr wrap="square" rtlCol="0">
+            <a:spAutoFit/>
+          </a:bodyPr>
+          <a:lstStyle/>
+          <a:p>
+            <a:pPr algn="ctr"/>
+            <a:r>
+              <a:rPr lang="es-ES" sz="4800" dirty="0" smtClean="0">
+                <a:solidFill>
+                  <a:schemeClr val="bg1">
+                    <a:lumMod val="50000"/>
+                    <a:lumOff val="50000"/>
+                  </a:schemeClr>
+                </a:solidFill>
+              </a:rPr>
+              <a:t>GIT</a:t>
+            </a:r>
+            <a:r>
+              <a:rPr lang="es-ES" sz="4800" dirty="0" smtClean="0"/>
+              <a:t> </a:t>
+            </a:r>
+            <a:r>
+              <a:rPr lang="es-ES" sz="4800" dirty="0" err="1" smtClean="0"/>
+              <a:t>glossary</a:t>
+            </a:r>
+            <a:endParaRPr lang="ca-ES" sz="4800" dirty="0"/>
+          </a:p>
+        </p:txBody>
+      </p:sp>
+      <p:sp>
+        <p:nvSpPr>
+          <p:cNvPr id="22" name="21 CuadroTexto"/>
+          <p:cNvSpPr txBox="1"/>
+          <p:nvPr/>
+        </p:nvSpPr>
+        <p:spPr>
+          <a:xfrm>
+            <a:off x="0" y="2207436"/>
+            <a:ext cx="9144000" cy="830997"/>
+          </a:xfrm>
+          <a:prstGeom prst="rect">
+            <a:avLst/>
+          </a:prstGeom>
+          <a:noFill/>
+        </p:spPr>
+        <p:txBody>
+          <a:bodyPr wrap="square" rtlCol="0">
+            <a:spAutoFit/>
+          </a:bodyPr>
+          <a:lstStyle/>
+          <a:p>
+            <a:pPr algn="ctr"/>
+            <a:r>
+              <a:rPr lang="es-ES" sz="4800" dirty="0" err="1" smtClean="0"/>
+              <a:t>push</a:t>
+            </a:r>
+            <a:endParaRPr lang="ca-ES" sz="4800" dirty="0"/>
+          </a:p>
+        </p:txBody>
+      </p:sp>
+      <p:sp>
+        <p:nvSpPr>
+          <p:cNvPr id="2" name="1 Rectángulo"/>
+          <p:cNvSpPr/>
+          <p:nvPr/>
+        </p:nvSpPr>
+        <p:spPr>
+          <a:xfrm>
+            <a:off x="5494475" y="6488668"/>
+            <a:ext cx="3649525" cy="369332"/>
+          </a:xfrm>
+          <a:prstGeom prst="rect">
+            <a:avLst/>
+          </a:prstGeom>
+        </p:spPr>
+        <p:txBody>
+          <a:bodyPr wrap="none">
+            <a:spAutoFit/>
+          </a:bodyPr>
+          <a:lstStyle/>
+          <a:p>
+            <a:r>
+              <a:rPr lang="ca-ES" dirty="0" smtClean="0">
+                <a:solidFill>
+                  <a:schemeClr val="bg1">
+                    <a:lumMod val="50000"/>
+                    <a:lumOff val="50000"/>
+                  </a:schemeClr>
+                </a:solidFill>
+              </a:rPr>
+              <a:t>https://git-scm.com/docs/gitglossary</a:t>
+            </a:r>
+            <a:endParaRPr lang="ca-ES" dirty="0">
+              <a:solidFill>
+                <a:schemeClr val="bg1">
+                  <a:lumMod val="50000"/>
+                  <a:lumOff val="50000"/>
+                </a:schemeClr>
+              </a:solidFill>
+            </a:endParaRPr>
+          </a:p>
+        </p:txBody>
+      </p:sp>
+      <p:sp>
+        <p:nvSpPr>
+          <p:cNvPr id="3" name="2 Rectángulo"/>
+          <p:cNvSpPr/>
+          <p:nvPr/>
+        </p:nvSpPr>
+        <p:spPr>
+          <a:xfrm>
+            <a:off x="1687179" y="3252903"/>
+            <a:ext cx="5769641" cy="954107"/>
+          </a:xfrm>
+          <a:prstGeom prst="rect">
+            <a:avLst/>
+          </a:prstGeom>
+        </p:spPr>
+        <p:txBody>
+          <a:bodyPr wrap="square">
+            <a:spAutoFit/>
+          </a:bodyPr>
+          <a:lstStyle/>
+          <a:p>
+            <a:pPr algn="ctr"/>
+            <a:r>
+              <a:rPr lang="en-US" sz="2800" dirty="0" smtClean="0">
+                <a:effectLst/>
+              </a:rPr>
+              <a:t>To put local objects into the remote </a:t>
+            </a:r>
+            <a:r>
+              <a:rPr lang="en-US" sz="2800" dirty="0"/>
+              <a:t>object </a:t>
+            </a:r>
+            <a:r>
+              <a:rPr lang="en-US" sz="2800" dirty="0" smtClean="0"/>
+              <a:t>database</a:t>
+            </a:r>
+            <a:endParaRPr lang="ca-ES" sz="2800" dirty="0"/>
+          </a:p>
+        </p:txBody>
+      </p:sp>
+    </p:spTree>
+    <p:extLst>
+      <p:ext uri="{BB962C8B-B14F-4D97-AF65-F5344CB8AC3E}">
+        <p14:creationId xmlns:p14="http://schemas.microsoft.com/office/powerpoint/2010/main" val="2638868203"/>
       </p:ext>
     </p:extLst>
   </p:cSld>

</xml_diff>

<commit_message>
Add more commands to the Powerpoint
</commit_message>
<xml_diff>
--- a/From CVS to GIT.pptx
+++ b/From CVS to GIT.pptx
@@ -27,8 +27,10 @@
     <p:sldId id="278" r:id="rId21"/>
     <p:sldId id="279" r:id="rId22"/>
     <p:sldId id="280" r:id="rId23"/>
-    <p:sldId id="274" r:id="rId24"/>
-    <p:sldId id="271" r:id="rId25"/>
+    <p:sldId id="281" r:id="rId24"/>
+    <p:sldId id="282" r:id="rId25"/>
+    <p:sldId id="274" r:id="rId26"/>
+    <p:sldId id="271" r:id="rId27"/>
   </p:sldIdLst>
   <p:sldSz cx="9144000" cy="6858000" type="screen4x3"/>
   <p:notesSz cx="6858000" cy="9144000"/>
@@ -6417,8 +6419,8 @@
         </p:nvSpPr>
         <p:spPr>
           <a:xfrm>
-            <a:off x="0" y="3212976"/>
-            <a:ext cx="9144000" cy="954107"/>
+            <a:off x="1925960" y="3212975"/>
+            <a:ext cx="5292080" cy="1384995"/>
           </a:xfrm>
           <a:prstGeom prst="rect">
             <a:avLst/>
@@ -6430,7 +6432,6 @@
           </a:bodyPr>
           <a:lstStyle/>
           <a:p>
-            <a:pPr algn="ctr"/>
             <a:r>
               <a:rPr lang="es-ES" sz="2800" dirty="0" err="1"/>
               <a:t>git</a:t>
@@ -6501,7 +6502,6 @@
             </a:endParaRPr>
           </a:p>
           <a:p>
-            <a:pPr algn="ctr"/>
             <a:r>
               <a:rPr lang="es-ES" sz="2800" dirty="0" err="1"/>
               <a:t>git</a:t>
@@ -6536,9 +6536,100 @@
             </a:r>
             <a:r>
               <a:rPr lang="es-ES" sz="2800" dirty="0" smtClean="0"/>
-              <a:t>"</a:t>
-            </a:r>
-            <a:endParaRPr lang="es-ES" sz="2800" dirty="0"/>
+              <a:t>«</a:t>
+            </a:r>
+          </a:p>
+          <a:p>
+            <a:r>
+              <a:rPr lang="ca-ES" sz="2800" dirty="0"/>
+              <a:t>git </a:t>
+            </a:r>
+            <a:r>
+              <a:rPr lang="ca-ES" sz="2800" dirty="0" err="1"/>
+              <a:t>commit</a:t>
+            </a:r>
+            <a:r>
+              <a:rPr lang="ca-ES" sz="2800" dirty="0"/>
+              <a:t> </a:t>
+            </a:r>
+            <a:r>
+              <a:rPr lang="ca-ES" sz="2800" dirty="0" smtClean="0"/>
+              <a:t>–a   </a:t>
+            </a:r>
+            <a:r>
+              <a:rPr lang="ca-ES" sz="2800" dirty="0" smtClean="0">
+                <a:solidFill>
+                  <a:schemeClr val="bg1">
+                    <a:lumMod val="50000"/>
+                    <a:lumOff val="50000"/>
+                  </a:schemeClr>
+                </a:solidFill>
+              </a:rPr>
+              <a:t>// to </a:t>
+            </a:r>
+            <a:r>
+              <a:rPr lang="ca-ES" sz="2800" dirty="0" err="1" smtClean="0">
+                <a:solidFill>
+                  <a:schemeClr val="bg1">
+                    <a:lumMod val="50000"/>
+                    <a:lumOff val="50000"/>
+                  </a:schemeClr>
+                </a:solidFill>
+              </a:rPr>
+              <a:t>also</a:t>
+            </a:r>
+            <a:r>
+              <a:rPr lang="ca-ES" sz="2800" dirty="0" smtClean="0">
+                <a:solidFill>
+                  <a:schemeClr val="bg1">
+                    <a:lumMod val="50000"/>
+                    <a:lumOff val="50000"/>
+                  </a:schemeClr>
+                </a:solidFill>
+              </a:rPr>
+              <a:t> do </a:t>
+            </a:r>
+            <a:r>
+              <a:rPr lang="ca-ES" sz="2800" dirty="0" err="1" smtClean="0">
+                <a:solidFill>
+                  <a:schemeClr val="bg1">
+                    <a:lumMod val="50000"/>
+                    <a:lumOff val="50000"/>
+                  </a:schemeClr>
+                </a:solidFill>
+              </a:rPr>
+              <a:t>an</a:t>
+            </a:r>
+            <a:r>
+              <a:rPr lang="ca-ES" sz="2800" dirty="0" smtClean="0">
+                <a:solidFill>
+                  <a:schemeClr val="bg1">
+                    <a:lumMod val="50000"/>
+                    <a:lumOff val="50000"/>
+                  </a:schemeClr>
+                </a:solidFill>
+              </a:rPr>
+              <a:t> </a:t>
+            </a:r>
+            <a:r>
+              <a:rPr lang="ca-ES" sz="2800" dirty="0" err="1" smtClean="0">
+                <a:solidFill>
+                  <a:schemeClr val="bg1">
+                    <a:lumMod val="50000"/>
+                    <a:lumOff val="50000"/>
+                  </a:schemeClr>
+                </a:solidFill>
+              </a:rPr>
+              <a:t>add</a:t>
+            </a:r>
+            <a:endParaRPr lang="es-ES" sz="2800" dirty="0">
+              <a:solidFill>
+                <a:schemeClr val="bg1">
+                  <a:lumMod val="50000"/>
+                  <a:lumOff val="50000"/>
+                </a:schemeClr>
+              </a:solidFill>
+            </a:endParaRPr>
           </a:p>
         </p:txBody>
       </p:sp>
@@ -6825,6 +6916,435 @@
             </a:r>
             <a:r>
               <a:rPr lang="es-ES" sz="4800" dirty="0" err="1" smtClean="0"/>
+              <a:t>commands</a:t>
+            </a:r>
+            <a:endParaRPr lang="ca-ES" sz="4800" dirty="0"/>
+          </a:p>
+        </p:txBody>
+      </p:sp>
+      <p:sp>
+        <p:nvSpPr>
+          <p:cNvPr id="2" name="1 Rectángulo"/>
+          <p:cNvSpPr/>
+          <p:nvPr/>
+        </p:nvSpPr>
+        <p:spPr>
+          <a:xfrm>
+            <a:off x="2645648" y="6488668"/>
+            <a:ext cx="6678880" cy="369332"/>
+          </a:xfrm>
+          <a:prstGeom prst="rect">
+            <a:avLst/>
+          </a:prstGeom>
+        </p:spPr>
+        <p:txBody>
+          <a:bodyPr wrap="none">
+            <a:spAutoFit/>
+          </a:bodyPr>
+          <a:lstStyle/>
+          <a:p>
+            <a:r>
+              <a:rPr lang="ca-ES" dirty="0">
+                <a:solidFill>
+                  <a:schemeClr val="bg1">
+                    <a:lumMod val="50000"/>
+                    <a:lumOff val="50000"/>
+                  </a:schemeClr>
+                </a:solidFill>
+              </a:rPr>
+              <a:t>https://git-scm.com/book/id/v2/Git-Basics-Getting-a-Git-Repository</a:t>
+            </a:r>
+            <a:endParaRPr lang="ca-ES" dirty="0">
+              <a:solidFill>
+                <a:schemeClr val="bg1">
+                  <a:lumMod val="50000"/>
+                  <a:lumOff val="50000"/>
+                </a:schemeClr>
+              </a:solidFill>
+            </a:endParaRPr>
+          </a:p>
+        </p:txBody>
+      </p:sp>
+      <p:sp>
+        <p:nvSpPr>
+          <p:cNvPr id="3" name="2 Rectángulo"/>
+          <p:cNvSpPr/>
+          <p:nvPr/>
+        </p:nvSpPr>
+        <p:spPr>
+          <a:xfrm>
+            <a:off x="3563888" y="3196720"/>
+            <a:ext cx="2592288" cy="1384995"/>
+          </a:xfrm>
+          <a:prstGeom prst="rect">
+            <a:avLst/>
+          </a:prstGeom>
+        </p:spPr>
+        <p:txBody>
+          <a:bodyPr wrap="square">
+            <a:spAutoFit/>
+          </a:bodyPr>
+          <a:lstStyle/>
+          <a:p>
+            <a:r>
+              <a:rPr lang="es-ES" sz="2800" dirty="0" err="1"/>
+              <a:t>git</a:t>
+            </a:r>
+            <a:r>
+              <a:rPr lang="es-ES" sz="2800" dirty="0"/>
+              <a:t> </a:t>
+            </a:r>
+            <a:r>
+              <a:rPr lang="es-ES" sz="2800" dirty="0" smtClean="0"/>
+              <a:t>status</a:t>
+            </a:r>
+          </a:p>
+          <a:p>
+            <a:r>
+              <a:rPr lang="es-ES" sz="2800" dirty="0" err="1" smtClean="0"/>
+              <a:t>git</a:t>
+            </a:r>
+            <a:r>
+              <a:rPr lang="es-ES" sz="2800" dirty="0" smtClean="0"/>
+              <a:t> status -s</a:t>
+            </a:r>
+          </a:p>
+          <a:p>
+            <a:r>
+              <a:rPr lang="es-ES" sz="2800" dirty="0" err="1"/>
+              <a:t>git</a:t>
+            </a:r>
+            <a:r>
+              <a:rPr lang="es-ES" sz="2800" dirty="0"/>
+              <a:t> status </a:t>
+            </a:r>
+            <a:r>
+              <a:rPr lang="es-ES" sz="2800" dirty="0" smtClean="0"/>
+              <a:t>-short</a:t>
+            </a:r>
+            <a:endParaRPr lang="es-ES" sz="2800" dirty="0"/>
+          </a:p>
+        </p:txBody>
+      </p:sp>
+      <p:sp>
+        <p:nvSpPr>
+          <p:cNvPr id="6" name="5 CuadroTexto"/>
+          <p:cNvSpPr txBox="1"/>
+          <p:nvPr/>
+        </p:nvSpPr>
+        <p:spPr>
+          <a:xfrm>
+            <a:off x="0" y="2207436"/>
+            <a:ext cx="9144000" cy="830997"/>
+          </a:xfrm>
+          <a:prstGeom prst="rect">
+            <a:avLst/>
+          </a:prstGeom>
+          <a:noFill/>
+        </p:spPr>
+        <p:txBody>
+          <a:bodyPr wrap="square" rtlCol="0">
+            <a:spAutoFit/>
+          </a:bodyPr>
+          <a:lstStyle/>
+          <a:p>
+            <a:pPr algn="ctr"/>
+            <a:r>
+              <a:rPr lang="es-ES" sz="4800" dirty="0" smtClean="0"/>
+              <a:t>status of </a:t>
+            </a:r>
+            <a:r>
+              <a:rPr lang="es-ES" sz="4800" dirty="0" err="1" smtClean="0"/>
+              <a:t>the</a:t>
+            </a:r>
+            <a:r>
+              <a:rPr lang="es-ES" sz="4800" dirty="0" smtClean="0"/>
+              <a:t> repo</a:t>
+            </a:r>
+            <a:endParaRPr lang="ca-ES" sz="4800" dirty="0"/>
+          </a:p>
+        </p:txBody>
+      </p:sp>
+    </p:spTree>
+    <p:extLst>
+      <p:ext uri="{BB962C8B-B14F-4D97-AF65-F5344CB8AC3E}">
+        <p14:creationId xmlns:p14="http://schemas.microsoft.com/office/powerpoint/2010/main" val="3717206163"/>
+      </p:ext>
+    </p:extLst>
+  </p:cSld>
+  <p:clrMapOvr>
+    <a:masterClrMapping/>
+  </p:clrMapOvr>
+  <p:timing>
+    <p:tnLst>
+      <p:par>
+        <p:cTn id="1" dur="indefinite" restart="never" nodeType="tmRoot"/>
+      </p:par>
+    </p:tnLst>
+  </p:timing>
+</p:sld>
+</file>
+
+<file path=ppt/slides/slide24.xml><?xml version="1.0" encoding="utf-8"?>
+<p:sld xmlns:a="http://schemas.openxmlformats.org/drawingml/2006/main" xmlns:r="http://schemas.openxmlformats.org/officeDocument/2006/relationships" xmlns:p="http://schemas.openxmlformats.org/presentationml/2006/main">
+  <p:cSld>
+    <p:spTree>
+      <p:nvGrpSpPr>
+        <p:cNvPr id="1" name=""/>
+        <p:cNvGrpSpPr/>
+        <p:nvPr/>
+      </p:nvGrpSpPr>
+      <p:grpSpPr>
+        <a:xfrm>
+          <a:off x="0" y="0"/>
+          <a:ext cx="0" cy="0"/>
+          <a:chOff x="0" y="0"/>
+          <a:chExt cx="0" cy="0"/>
+        </a:xfrm>
+      </p:grpSpPr>
+      <p:sp>
+        <p:nvSpPr>
+          <p:cNvPr id="4" name="3 CuadroTexto"/>
+          <p:cNvSpPr txBox="1"/>
+          <p:nvPr/>
+        </p:nvSpPr>
+        <p:spPr>
+          <a:xfrm>
+            <a:off x="0" y="404664"/>
+            <a:ext cx="9144000" cy="830997"/>
+          </a:xfrm>
+          <a:prstGeom prst="rect">
+            <a:avLst/>
+          </a:prstGeom>
+          <a:noFill/>
+        </p:spPr>
+        <p:txBody>
+          <a:bodyPr wrap="square" rtlCol="0">
+            <a:spAutoFit/>
+          </a:bodyPr>
+          <a:lstStyle/>
+          <a:p>
+            <a:pPr algn="ctr"/>
+            <a:r>
+              <a:rPr lang="es-ES" sz="4800" dirty="0" smtClean="0">
+                <a:solidFill>
+                  <a:schemeClr val="bg1">
+                    <a:lumMod val="50000"/>
+                    <a:lumOff val="50000"/>
+                  </a:schemeClr>
+                </a:solidFill>
+              </a:rPr>
+              <a:t>GIT</a:t>
+            </a:r>
+            <a:r>
+              <a:rPr lang="es-ES" sz="4800" dirty="0" smtClean="0"/>
+              <a:t> </a:t>
+            </a:r>
+            <a:r>
+              <a:rPr lang="es-ES" sz="4800" dirty="0" err="1" smtClean="0"/>
+              <a:t>commands</a:t>
+            </a:r>
+            <a:endParaRPr lang="ca-ES" sz="4800" dirty="0"/>
+          </a:p>
+        </p:txBody>
+      </p:sp>
+      <p:sp>
+        <p:nvSpPr>
+          <p:cNvPr id="2" name="1 Rectángulo"/>
+          <p:cNvSpPr/>
+          <p:nvPr/>
+        </p:nvSpPr>
+        <p:spPr>
+          <a:xfrm>
+            <a:off x="2645648" y="6488668"/>
+            <a:ext cx="6678880" cy="369332"/>
+          </a:xfrm>
+          <a:prstGeom prst="rect">
+            <a:avLst/>
+          </a:prstGeom>
+        </p:spPr>
+        <p:txBody>
+          <a:bodyPr wrap="none">
+            <a:spAutoFit/>
+          </a:bodyPr>
+          <a:lstStyle/>
+          <a:p>
+            <a:r>
+              <a:rPr lang="ca-ES" dirty="0">
+                <a:solidFill>
+                  <a:schemeClr val="bg1">
+                    <a:lumMod val="50000"/>
+                    <a:lumOff val="50000"/>
+                  </a:schemeClr>
+                </a:solidFill>
+              </a:rPr>
+              <a:t>https://git-scm.com/book/id/v2/Git-Basics-Getting-a-Git-Repository</a:t>
+            </a:r>
+            <a:endParaRPr lang="ca-ES" dirty="0">
+              <a:solidFill>
+                <a:schemeClr val="bg1">
+                  <a:lumMod val="50000"/>
+                  <a:lumOff val="50000"/>
+                </a:schemeClr>
+              </a:solidFill>
+            </a:endParaRPr>
+          </a:p>
+        </p:txBody>
+      </p:sp>
+      <p:sp>
+        <p:nvSpPr>
+          <p:cNvPr id="3" name="2 Rectángulo"/>
+          <p:cNvSpPr/>
+          <p:nvPr/>
+        </p:nvSpPr>
+        <p:spPr>
+          <a:xfrm>
+            <a:off x="3563888" y="3196720"/>
+            <a:ext cx="2592288" cy="523220"/>
+          </a:xfrm>
+          <a:prstGeom prst="rect">
+            <a:avLst/>
+          </a:prstGeom>
+        </p:spPr>
+        <p:txBody>
+          <a:bodyPr wrap="square">
+            <a:spAutoFit/>
+          </a:bodyPr>
+          <a:lstStyle/>
+          <a:p>
+            <a:pPr algn="ctr"/>
+            <a:r>
+              <a:rPr lang="es-ES" sz="2800" dirty="0" err="1"/>
+              <a:t>git</a:t>
+            </a:r>
+            <a:r>
+              <a:rPr lang="es-ES" sz="2800" dirty="0"/>
+              <a:t> </a:t>
+            </a:r>
+            <a:r>
+              <a:rPr lang="es-ES" sz="2800" dirty="0" smtClean="0"/>
+              <a:t>log</a:t>
+            </a:r>
+            <a:endParaRPr lang="es-ES" sz="2800" dirty="0"/>
+          </a:p>
+        </p:txBody>
+      </p:sp>
+      <p:sp>
+        <p:nvSpPr>
+          <p:cNvPr id="6" name="5 CuadroTexto"/>
+          <p:cNvSpPr txBox="1"/>
+          <p:nvPr/>
+        </p:nvSpPr>
+        <p:spPr>
+          <a:xfrm>
+            <a:off x="0" y="2207436"/>
+            <a:ext cx="9144000" cy="830997"/>
+          </a:xfrm>
+          <a:prstGeom prst="rect">
+            <a:avLst/>
+          </a:prstGeom>
+          <a:noFill/>
+        </p:spPr>
+        <p:txBody>
+          <a:bodyPr wrap="square" rtlCol="0">
+            <a:spAutoFit/>
+          </a:bodyPr>
+          <a:lstStyle/>
+          <a:p>
+            <a:pPr algn="ctr"/>
+            <a:r>
+              <a:rPr lang="es-ES" sz="4800" dirty="0" err="1" smtClean="0"/>
+              <a:t>commit</a:t>
+            </a:r>
+            <a:r>
+              <a:rPr lang="es-ES" sz="4800" dirty="0" smtClean="0"/>
+              <a:t> </a:t>
+            </a:r>
+            <a:r>
+              <a:rPr lang="es-ES" sz="4800" dirty="0" err="1" smtClean="0"/>
+              <a:t>history</a:t>
+            </a:r>
+            <a:endParaRPr lang="ca-ES" sz="4800" dirty="0"/>
+          </a:p>
+        </p:txBody>
+      </p:sp>
+    </p:spTree>
+    <p:extLst>
+      <p:ext uri="{BB962C8B-B14F-4D97-AF65-F5344CB8AC3E}">
+        <p14:creationId xmlns:p14="http://schemas.microsoft.com/office/powerpoint/2010/main" val="3814801426"/>
+      </p:ext>
+    </p:extLst>
+  </p:cSld>
+  <p:clrMapOvr>
+    <a:masterClrMapping/>
+  </p:clrMapOvr>
+  <p:timing>
+    <p:tnLst>
+      <p:par>
+        <p:cTn id="1" dur="indefinite" restart="never" nodeType="tmRoot"/>
+      </p:par>
+    </p:tnLst>
+  </p:timing>
+</p:sld>
+</file>
+
+<file path=ppt/slides/slide25.xml><?xml version="1.0" encoding="utf-8"?>
+<p:sld xmlns:a="http://schemas.openxmlformats.org/drawingml/2006/main" xmlns:r="http://schemas.openxmlformats.org/officeDocument/2006/relationships" xmlns:p="http://schemas.openxmlformats.org/presentationml/2006/main">
+  <p:cSld>
+    <p:spTree>
+      <p:nvGrpSpPr>
+        <p:cNvPr id="1" name=""/>
+        <p:cNvGrpSpPr/>
+        <p:nvPr/>
+      </p:nvGrpSpPr>
+      <p:grpSpPr>
+        <a:xfrm>
+          <a:off x="0" y="0"/>
+          <a:ext cx="0" cy="0"/>
+          <a:chOff x="0" y="0"/>
+          <a:chExt cx="0" cy="0"/>
+        </a:xfrm>
+      </p:grpSpPr>
+      <p:sp>
+        <p:nvSpPr>
+          <p:cNvPr id="4" name="3 CuadroTexto"/>
+          <p:cNvSpPr txBox="1"/>
+          <p:nvPr/>
+        </p:nvSpPr>
+        <p:spPr>
+          <a:xfrm>
+            <a:off x="0" y="404664"/>
+            <a:ext cx="9144000" cy="830997"/>
+          </a:xfrm>
+          <a:prstGeom prst="rect">
+            <a:avLst/>
+          </a:prstGeom>
+          <a:noFill/>
+        </p:spPr>
+        <p:txBody>
+          <a:bodyPr wrap="square" rtlCol="0">
+            <a:spAutoFit/>
+          </a:bodyPr>
+          <a:lstStyle/>
+          <a:p>
+            <a:pPr algn="ctr"/>
+            <a:r>
+              <a:rPr lang="es-ES" sz="4800" dirty="0" smtClean="0">
+                <a:solidFill>
+                  <a:schemeClr val="bg1">
+                    <a:lumMod val="50000"/>
+                    <a:lumOff val="50000"/>
+                  </a:schemeClr>
+                </a:solidFill>
+              </a:rPr>
+              <a:t>GIT</a:t>
+            </a:r>
+            <a:r>
+              <a:rPr lang="es-ES" sz="4800" dirty="0" smtClean="0"/>
+              <a:t> </a:t>
+            </a:r>
+            <a:r>
+              <a:rPr lang="es-ES" sz="4800" dirty="0" err="1" smtClean="0"/>
               <a:t>glossary</a:t>
             </a:r>
             <a:endParaRPr lang="ca-ES" sz="4800" dirty="0"/>
@@ -6967,7 +7487,7 @@
 </p:sld>
 </file>
 
-<file path=ppt/slides/slide24.xml><?xml version="1.0" encoding="utf-8"?>
+<file path=ppt/slides/slide26.xml><?xml version="1.0" encoding="utf-8"?>
 <p:sld xmlns:a="http://schemas.openxmlformats.org/drawingml/2006/main" xmlns:r="http://schemas.openxmlformats.org/officeDocument/2006/relationships" xmlns:p="http://schemas.openxmlformats.org/presentationml/2006/main">
   <p:cSld>
     <p:spTree>

</xml_diff>

<commit_message>
Work with remotes: adding, pushing and pulling
</commit_message>
<xml_diff>
--- a/From CVS to GIT.pptx
+++ b/From CVS to GIT.pptx
@@ -29,8 +29,12 @@
     <p:sldId id="280" r:id="rId23"/>
     <p:sldId id="281" r:id="rId24"/>
     <p:sldId id="282" r:id="rId25"/>
-    <p:sldId id="274" r:id="rId26"/>
-    <p:sldId id="271" r:id="rId27"/>
+    <p:sldId id="284" r:id="rId26"/>
+    <p:sldId id="283" r:id="rId27"/>
+    <p:sldId id="271" r:id="rId28"/>
+    <p:sldId id="285" r:id="rId29"/>
+    <p:sldId id="274" r:id="rId30"/>
+    <p:sldId id="286" r:id="rId31"/>
   </p:sldIdLst>
   <p:sldSz cx="9144000" cy="6858000" type="screen4x3"/>
   <p:notesSz cx="6858000" cy="9144000"/>
@@ -7156,8 +7160,8 @@
         </p:nvSpPr>
         <p:spPr>
           <a:xfrm>
-            <a:off x="2645648" y="6488668"/>
-            <a:ext cx="6678880" cy="369332"/>
+            <a:off x="2203974" y="6488668"/>
+            <a:ext cx="6935297" cy="369332"/>
           </a:xfrm>
           <a:prstGeom prst="rect">
             <a:avLst/>
@@ -7178,7 +7182,7 @@
                   </a:schemeClr>
                 </a:solidFill>
               </a:rPr>
-              <a:t>https://git-scm.com/book/id/v2/Git-Basics-Getting-a-Git-Repository</a:t>
+              <a:t>https://git-scm.com/book/id/v2/Git-Basics-Viewing-the-Commit-History</a:t>
             </a:r>
             <a:endParaRPr lang="ca-ES" dirty="0">
               <a:solidFill>
@@ -7376,7 +7380,15 @@
             <a:pPr algn="ctr"/>
             <a:r>
               <a:rPr lang="es-ES" sz="4800" dirty="0" err="1" smtClean="0"/>
-              <a:t>pull</a:t>
+              <a:t>remote</a:t>
+            </a:r>
+            <a:r>
+              <a:rPr lang="es-ES" sz="4800" dirty="0" smtClean="0"/>
+              <a:t> </a:t>
+            </a:r>
+            <a:r>
+              <a:rPr lang="es-ES" sz="4800" dirty="0" err="1" smtClean="0"/>
+              <a:t>repository</a:t>
             </a:r>
             <a:endParaRPr lang="ca-ES" sz="4800" dirty="0"/>
           </a:p>
@@ -7433,8 +7445,8 @@
         </p:nvSpPr>
         <p:spPr>
           <a:xfrm>
-            <a:off x="1106615" y="3248610"/>
-            <a:ext cx="6930770" cy="523220"/>
+            <a:off x="1403649" y="3252903"/>
+            <a:ext cx="6336704" cy="954107"/>
           </a:xfrm>
           <a:prstGeom prst="rect">
             <a:avLst/>
@@ -7448,29 +7460,29 @@
           <a:p>
             <a:pPr algn="ctr"/>
             <a:r>
+              <a:rPr lang="en-US" sz="2800" dirty="0"/>
+              <a:t>A </a:t>
+            </a:r>
+            <a:r>
+              <a:rPr lang="en-US" sz="2800" dirty="0"/>
+              <a:t>repository</a:t>
+            </a:r>
+            <a:r>
+              <a:rPr lang="en-US" sz="2800" dirty="0"/>
+              <a:t> which is used to track the same project but resides somewhere else</a:t>
+            </a:r>
+            <a:r>
               <a:rPr lang="en-US" sz="2800" dirty="0" smtClean="0"/>
-              <a:t>To</a:t>
-            </a:r>
-            <a:r>
-              <a:rPr lang="en-US" sz="2800" dirty="0"/>
-              <a:t> fetch </a:t>
-            </a:r>
-            <a:r>
-              <a:rPr lang="en-US" sz="2800" dirty="0" smtClean="0"/>
-              <a:t>a branch and</a:t>
-            </a:r>
-            <a:r>
-              <a:rPr lang="en-US" sz="2800" dirty="0"/>
-              <a:t> merge it.</a:t>
-            </a:r>
-            <a:endParaRPr lang="ca-ES" sz="2800" dirty="0"/>
+              <a:t>.</a:t>
+            </a:r>
+            <a:endParaRPr lang="en-US" sz="2800" dirty="0"/>
           </a:p>
         </p:txBody>
       </p:sp>
     </p:spTree>
     <p:extLst>
       <p:ext uri="{BB962C8B-B14F-4D97-AF65-F5344CB8AC3E}">
-        <p14:creationId xmlns:p14="http://schemas.microsoft.com/office/powerpoint/2010/main" val="3345413051"/>
+        <p14:creationId xmlns:p14="http://schemas.microsoft.com/office/powerpoint/2010/main" val="49895251"/>
       </p:ext>
     </p:extLst>
   </p:cSld>
@@ -7544,38 +7556,7 @@
             </a:r>
             <a:r>
               <a:rPr lang="es-ES" sz="4800" dirty="0" err="1" smtClean="0"/>
-              <a:t>glossary</a:t>
-            </a:r>
-            <a:endParaRPr lang="ca-ES" sz="4800" dirty="0"/>
-          </a:p>
-        </p:txBody>
-      </p:sp>
-      <p:sp>
-        <p:nvSpPr>
-          <p:cNvPr id="22" name="21 CuadroTexto"/>
-          <p:cNvSpPr txBox="1"/>
-          <p:nvPr/>
-        </p:nvSpPr>
-        <p:spPr>
-          <a:xfrm>
-            <a:off x="0" y="2207436"/>
-            <a:ext cx="9144000" cy="830997"/>
-          </a:xfrm>
-          <a:prstGeom prst="rect">
-            <a:avLst/>
-          </a:prstGeom>
-          <a:noFill/>
-        </p:spPr>
-        <p:txBody>
-          <a:bodyPr wrap="square" rtlCol="0">
-            <a:spAutoFit/>
-          </a:bodyPr>
-          <a:lstStyle/>
-          <a:p>
-            <a:pPr algn="ctr"/>
-            <a:r>
-              <a:rPr lang="es-ES" sz="4800" dirty="0" err="1" smtClean="0"/>
-              <a:t>push</a:t>
+              <a:t>commands</a:t>
             </a:r>
             <a:endParaRPr lang="ca-ES" sz="4800" dirty="0"/>
           </a:p>
@@ -7589,8 +7570,8 @@
         </p:nvSpPr>
         <p:spPr>
           <a:xfrm>
-            <a:off x="5494475" y="6488668"/>
-            <a:ext cx="3649525" cy="369332"/>
+            <a:off x="2715884" y="6488668"/>
+            <a:ext cx="6417334" cy="369332"/>
           </a:xfrm>
           <a:prstGeom prst="rect">
             <a:avLst/>
@@ -7603,15 +7584,15 @@
           <a:lstStyle/>
           <a:p>
             <a:r>
-              <a:rPr lang="ca-ES" dirty="0" smtClean="0">
-                <a:solidFill>
-                  <a:schemeClr val="bg1">
-                    <a:lumMod val="50000"/>
-                    <a:lumOff val="50000"/>
-                  </a:schemeClr>
-                </a:solidFill>
-              </a:rPr>
-              <a:t>https://git-scm.com/docs/gitglossary</a:t>
+              <a:rPr lang="ca-ES" dirty="0">
+                <a:solidFill>
+                  <a:schemeClr val="bg1">
+                    <a:lumMod val="50000"/>
+                    <a:lumOff val="50000"/>
+                  </a:schemeClr>
+                </a:solidFill>
+              </a:rPr>
+              <a:t>https://git-scm.com/book/id/v2/Git-Basics-Working-with-Remotes</a:t>
             </a:r>
             <a:endParaRPr lang="ca-ES" dirty="0">
               <a:solidFill>
@@ -7632,6 +7613,433 @@
         </p:nvSpPr>
         <p:spPr>
           <a:xfrm>
+            <a:off x="0" y="3196720"/>
+            <a:ext cx="9144000" cy="1384995"/>
+          </a:xfrm>
+          <a:prstGeom prst="rect">
+            <a:avLst/>
+          </a:prstGeom>
+        </p:spPr>
+        <p:txBody>
+          <a:bodyPr wrap="square">
+            <a:spAutoFit/>
+          </a:bodyPr>
+          <a:lstStyle/>
+          <a:p>
+            <a:pPr algn="ctr"/>
+            <a:r>
+              <a:rPr lang="es-ES" sz="2800" dirty="0" err="1"/>
+              <a:t>git</a:t>
+            </a:r>
+            <a:r>
+              <a:rPr lang="es-ES" sz="2800" dirty="0"/>
+              <a:t> </a:t>
+            </a:r>
+            <a:r>
+              <a:rPr lang="es-ES" sz="2800" dirty="0" err="1" smtClean="0"/>
+              <a:t>remote</a:t>
+            </a:r>
+            <a:r>
+              <a:rPr lang="es-ES" sz="2800" dirty="0" smtClean="0"/>
+              <a:t> </a:t>
+            </a:r>
+            <a:r>
+              <a:rPr lang="es-ES" sz="2800" dirty="0" err="1" smtClean="0"/>
+              <a:t>add</a:t>
+            </a:r>
+            <a:r>
+              <a:rPr lang="es-ES" sz="2800" dirty="0" smtClean="0"/>
+              <a:t> </a:t>
+            </a:r>
+            <a:r>
+              <a:rPr lang="es-ES" sz="2800" i="1" dirty="0" smtClean="0"/>
+              <a:t>[</a:t>
+            </a:r>
+            <a:r>
+              <a:rPr lang="es-ES" sz="2800" i="1" dirty="0" err="1" smtClean="0"/>
+              <a:t>shortname</a:t>
+            </a:r>
+            <a:r>
+              <a:rPr lang="es-ES" sz="2800" i="1" dirty="0" smtClean="0"/>
+              <a:t>] [</a:t>
+            </a:r>
+            <a:r>
+              <a:rPr lang="es-ES" sz="2800" i="1" dirty="0" err="1" smtClean="0"/>
+              <a:t>url</a:t>
+            </a:r>
+            <a:r>
+              <a:rPr lang="es-ES" sz="2800" i="1" dirty="0" smtClean="0"/>
+              <a:t>]</a:t>
+            </a:r>
+          </a:p>
+          <a:p>
+            <a:pPr algn="ctr"/>
+            <a:endParaRPr lang="es-ES" sz="2800" i="1" dirty="0"/>
+          </a:p>
+          <a:p>
+            <a:pPr algn="ctr"/>
+            <a:r>
+              <a:rPr lang="es-ES" sz="2800" dirty="0" smtClean="0">
+                <a:solidFill>
+                  <a:schemeClr val="bg1">
+                    <a:lumMod val="50000"/>
+                    <a:lumOff val="50000"/>
+                  </a:schemeClr>
+                </a:solidFill>
+              </a:rPr>
+              <a:t>"</a:t>
+            </a:r>
+            <a:r>
+              <a:rPr lang="ca-ES" sz="2800" dirty="0" err="1" smtClean="0">
+                <a:solidFill>
+                  <a:schemeClr val="bg1">
+                    <a:lumMod val="50000"/>
+                    <a:lumOff val="50000"/>
+                  </a:schemeClr>
+                </a:solidFill>
+              </a:rPr>
+              <a:t>origin</a:t>
+            </a:r>
+            <a:r>
+              <a:rPr lang="es-ES" sz="2800" dirty="0" smtClean="0">
+                <a:solidFill>
+                  <a:schemeClr val="bg1">
+                    <a:lumMod val="50000"/>
+                    <a:lumOff val="50000"/>
+                  </a:schemeClr>
+                </a:solidFill>
+              </a:rPr>
+              <a:t>"</a:t>
+            </a:r>
+            <a:r>
+              <a:rPr lang="ca-ES" sz="2800" dirty="0" smtClean="0">
+                <a:solidFill>
+                  <a:schemeClr val="bg1">
+                    <a:lumMod val="50000"/>
+                    <a:lumOff val="50000"/>
+                  </a:schemeClr>
+                </a:solidFill>
+              </a:rPr>
+              <a:t> is </a:t>
+            </a:r>
+            <a:r>
+              <a:rPr lang="ca-ES" sz="2800" dirty="0" err="1" smtClean="0">
+                <a:solidFill>
+                  <a:schemeClr val="bg1">
+                    <a:lumMod val="50000"/>
+                    <a:lumOff val="50000"/>
+                  </a:schemeClr>
+                </a:solidFill>
+              </a:rPr>
+              <a:t>the</a:t>
+            </a:r>
+            <a:r>
+              <a:rPr lang="ca-ES" sz="2800" dirty="0" smtClean="0">
+                <a:solidFill>
+                  <a:schemeClr val="bg1">
+                    <a:lumMod val="50000"/>
+                    <a:lumOff val="50000"/>
+                  </a:schemeClr>
+                </a:solidFill>
+              </a:rPr>
+              <a:t> </a:t>
+            </a:r>
+            <a:r>
+              <a:rPr lang="ca-ES" sz="2800" dirty="0" err="1" smtClean="0">
+                <a:solidFill>
+                  <a:schemeClr val="bg1">
+                    <a:lumMod val="50000"/>
+                    <a:lumOff val="50000"/>
+                  </a:schemeClr>
+                </a:solidFill>
+              </a:rPr>
+              <a:t>shortname</a:t>
+            </a:r>
+            <a:r>
+              <a:rPr lang="ca-ES" sz="2800" dirty="0" smtClean="0">
+                <a:solidFill>
+                  <a:schemeClr val="bg1">
+                    <a:lumMod val="50000"/>
+                    <a:lumOff val="50000"/>
+                  </a:schemeClr>
+                </a:solidFill>
+              </a:rPr>
+              <a:t> of </a:t>
+            </a:r>
+            <a:r>
+              <a:rPr lang="ca-ES" sz="2800" dirty="0" err="1" smtClean="0">
+                <a:solidFill>
+                  <a:schemeClr val="bg1">
+                    <a:lumMod val="50000"/>
+                    <a:lumOff val="50000"/>
+                  </a:schemeClr>
+                </a:solidFill>
+              </a:rPr>
+              <a:t>the</a:t>
+            </a:r>
+            <a:r>
+              <a:rPr lang="ca-ES" sz="2800" dirty="0" smtClean="0">
+                <a:solidFill>
+                  <a:schemeClr val="bg1">
+                    <a:lumMod val="50000"/>
+                    <a:lumOff val="50000"/>
+                  </a:schemeClr>
+                </a:solidFill>
+              </a:rPr>
+              <a:t> </a:t>
+            </a:r>
+            <a:r>
+              <a:rPr lang="ca-ES" sz="2800" dirty="0" err="1" smtClean="0">
+                <a:solidFill>
+                  <a:schemeClr val="bg1">
+                    <a:lumMod val="50000"/>
+                    <a:lumOff val="50000"/>
+                  </a:schemeClr>
+                </a:solidFill>
+              </a:rPr>
+              <a:t>default</a:t>
+            </a:r>
+            <a:r>
+              <a:rPr lang="ca-ES" sz="2800" dirty="0" smtClean="0">
+                <a:solidFill>
+                  <a:schemeClr val="bg1">
+                    <a:lumMod val="50000"/>
+                    <a:lumOff val="50000"/>
+                  </a:schemeClr>
+                </a:solidFill>
+              </a:rPr>
+              <a:t> </a:t>
+            </a:r>
+            <a:r>
+              <a:rPr lang="ca-ES" sz="2800" dirty="0" err="1" smtClean="0">
+                <a:solidFill>
+                  <a:schemeClr val="bg1">
+                    <a:lumMod val="50000"/>
+                    <a:lumOff val="50000"/>
+                  </a:schemeClr>
+                </a:solidFill>
+              </a:rPr>
+              <a:t>remote</a:t>
+            </a:r>
+            <a:endParaRPr lang="es-ES" sz="2800" i="1" dirty="0">
+              <a:solidFill>
+                <a:schemeClr val="bg1">
+                  <a:lumMod val="50000"/>
+                  <a:lumOff val="50000"/>
+                </a:schemeClr>
+              </a:solidFill>
+            </a:endParaRPr>
+          </a:p>
+        </p:txBody>
+      </p:sp>
+      <p:sp>
+        <p:nvSpPr>
+          <p:cNvPr id="6" name="5 CuadroTexto"/>
+          <p:cNvSpPr txBox="1"/>
+          <p:nvPr/>
+        </p:nvSpPr>
+        <p:spPr>
+          <a:xfrm>
+            <a:off x="0" y="2207436"/>
+            <a:ext cx="9144000" cy="830997"/>
+          </a:xfrm>
+          <a:prstGeom prst="rect">
+            <a:avLst/>
+          </a:prstGeom>
+          <a:noFill/>
+        </p:spPr>
+        <p:txBody>
+          <a:bodyPr wrap="square" rtlCol="0">
+            <a:spAutoFit/>
+          </a:bodyPr>
+          <a:lstStyle/>
+          <a:p>
+            <a:pPr algn="ctr"/>
+            <a:r>
+              <a:rPr lang="es-ES" sz="4800" dirty="0" err="1" smtClean="0"/>
+              <a:t>add</a:t>
+            </a:r>
+            <a:r>
+              <a:rPr lang="es-ES" sz="4800" dirty="0" smtClean="0"/>
+              <a:t> </a:t>
+            </a:r>
+            <a:r>
+              <a:rPr lang="es-ES" sz="4800" dirty="0"/>
+              <a:t>a </a:t>
+            </a:r>
+            <a:r>
+              <a:rPr lang="es-ES" sz="4800" dirty="0" err="1" smtClean="0"/>
+              <a:t>remote</a:t>
+            </a:r>
+            <a:endParaRPr lang="ca-ES" sz="4800" dirty="0"/>
+          </a:p>
+        </p:txBody>
+      </p:sp>
+    </p:spTree>
+    <p:extLst>
+      <p:ext uri="{BB962C8B-B14F-4D97-AF65-F5344CB8AC3E}">
+        <p14:creationId xmlns:p14="http://schemas.microsoft.com/office/powerpoint/2010/main" val="1022898478"/>
+      </p:ext>
+    </p:extLst>
+  </p:cSld>
+  <p:clrMapOvr>
+    <a:masterClrMapping/>
+  </p:clrMapOvr>
+  <p:timing>
+    <p:tnLst>
+      <p:par>
+        <p:cTn id="1" dur="indefinite" restart="never" nodeType="tmRoot"/>
+      </p:par>
+    </p:tnLst>
+  </p:timing>
+</p:sld>
+</file>
+
+<file path=ppt/slides/slide27.xml><?xml version="1.0" encoding="utf-8"?>
+<p:sld xmlns:a="http://schemas.openxmlformats.org/drawingml/2006/main" xmlns:r="http://schemas.openxmlformats.org/officeDocument/2006/relationships" xmlns:p="http://schemas.openxmlformats.org/presentationml/2006/main">
+  <p:cSld>
+    <p:spTree>
+      <p:nvGrpSpPr>
+        <p:cNvPr id="1" name=""/>
+        <p:cNvGrpSpPr/>
+        <p:nvPr/>
+      </p:nvGrpSpPr>
+      <p:grpSpPr>
+        <a:xfrm>
+          <a:off x="0" y="0"/>
+          <a:ext cx="0" cy="0"/>
+          <a:chOff x="0" y="0"/>
+          <a:chExt cx="0" cy="0"/>
+        </a:xfrm>
+      </p:grpSpPr>
+      <p:sp>
+        <p:nvSpPr>
+          <p:cNvPr id="4" name="3 CuadroTexto"/>
+          <p:cNvSpPr txBox="1"/>
+          <p:nvPr/>
+        </p:nvSpPr>
+        <p:spPr>
+          <a:xfrm>
+            <a:off x="0" y="404664"/>
+            <a:ext cx="9144000" cy="830997"/>
+          </a:xfrm>
+          <a:prstGeom prst="rect">
+            <a:avLst/>
+          </a:prstGeom>
+          <a:noFill/>
+        </p:spPr>
+        <p:txBody>
+          <a:bodyPr wrap="square" rtlCol="0">
+            <a:spAutoFit/>
+          </a:bodyPr>
+          <a:lstStyle/>
+          <a:p>
+            <a:pPr algn="ctr"/>
+            <a:r>
+              <a:rPr lang="es-ES" sz="4800" dirty="0" smtClean="0">
+                <a:solidFill>
+                  <a:schemeClr val="bg1">
+                    <a:lumMod val="50000"/>
+                    <a:lumOff val="50000"/>
+                  </a:schemeClr>
+                </a:solidFill>
+              </a:rPr>
+              <a:t>GIT</a:t>
+            </a:r>
+            <a:r>
+              <a:rPr lang="es-ES" sz="4800" dirty="0" smtClean="0"/>
+              <a:t> </a:t>
+            </a:r>
+            <a:r>
+              <a:rPr lang="es-ES" sz="4800" dirty="0" err="1" smtClean="0"/>
+              <a:t>glossary</a:t>
+            </a:r>
+            <a:endParaRPr lang="ca-ES" sz="4800" dirty="0"/>
+          </a:p>
+        </p:txBody>
+      </p:sp>
+      <p:sp>
+        <p:nvSpPr>
+          <p:cNvPr id="22" name="21 CuadroTexto"/>
+          <p:cNvSpPr txBox="1"/>
+          <p:nvPr/>
+        </p:nvSpPr>
+        <p:spPr>
+          <a:xfrm>
+            <a:off x="0" y="2207436"/>
+            <a:ext cx="9144000" cy="830997"/>
+          </a:xfrm>
+          <a:prstGeom prst="rect">
+            <a:avLst/>
+          </a:prstGeom>
+          <a:noFill/>
+        </p:spPr>
+        <p:txBody>
+          <a:bodyPr wrap="square" rtlCol="0">
+            <a:spAutoFit/>
+          </a:bodyPr>
+          <a:lstStyle/>
+          <a:p>
+            <a:pPr algn="ctr"/>
+            <a:r>
+              <a:rPr lang="es-ES" sz="4800" dirty="0" err="1" smtClean="0"/>
+              <a:t>push</a:t>
+            </a:r>
+            <a:endParaRPr lang="ca-ES" sz="4800" dirty="0"/>
+          </a:p>
+        </p:txBody>
+      </p:sp>
+      <p:sp>
+        <p:nvSpPr>
+          <p:cNvPr id="2" name="1 Rectángulo"/>
+          <p:cNvSpPr/>
+          <p:nvPr/>
+        </p:nvSpPr>
+        <p:spPr>
+          <a:xfrm>
+            <a:off x="5494475" y="6488668"/>
+            <a:ext cx="3649525" cy="369332"/>
+          </a:xfrm>
+          <a:prstGeom prst="rect">
+            <a:avLst/>
+          </a:prstGeom>
+        </p:spPr>
+        <p:txBody>
+          <a:bodyPr wrap="none">
+            <a:spAutoFit/>
+          </a:bodyPr>
+          <a:lstStyle/>
+          <a:p>
+            <a:r>
+              <a:rPr lang="ca-ES" dirty="0" smtClean="0">
+                <a:solidFill>
+                  <a:schemeClr val="bg1">
+                    <a:lumMod val="50000"/>
+                    <a:lumOff val="50000"/>
+                  </a:schemeClr>
+                </a:solidFill>
+              </a:rPr>
+              <a:t>https://git-scm.com/docs/gitglossary</a:t>
+            </a:r>
+            <a:endParaRPr lang="ca-ES" dirty="0">
+              <a:solidFill>
+                <a:schemeClr val="bg1">
+                  <a:lumMod val="50000"/>
+                  <a:lumOff val="50000"/>
+                </a:schemeClr>
+              </a:solidFill>
+            </a:endParaRPr>
+          </a:p>
+        </p:txBody>
+      </p:sp>
+      <p:sp>
+        <p:nvSpPr>
+          <p:cNvPr id="3" name="2 Rectángulo"/>
+          <p:cNvSpPr/>
+          <p:nvPr/>
+        </p:nvSpPr>
+        <p:spPr>
+          <a:xfrm>
             <a:off x="1687179" y="3252903"/>
             <a:ext cx="5769641" cy="954107"/>
           </a:xfrm>
@@ -7668,6 +8076,440 @@
     <p:extLst>
       <p:ext uri="{BB962C8B-B14F-4D97-AF65-F5344CB8AC3E}">
         <p14:creationId xmlns:p14="http://schemas.microsoft.com/office/powerpoint/2010/main" val="2638868203"/>
+      </p:ext>
+    </p:extLst>
+  </p:cSld>
+  <p:clrMapOvr>
+    <a:masterClrMapping/>
+  </p:clrMapOvr>
+  <p:timing>
+    <p:tnLst>
+      <p:par>
+        <p:cTn id="1" dur="indefinite" restart="never" nodeType="tmRoot"/>
+      </p:par>
+    </p:tnLst>
+  </p:timing>
+</p:sld>
+</file>
+
+<file path=ppt/slides/slide28.xml><?xml version="1.0" encoding="utf-8"?>
+<p:sld xmlns:a="http://schemas.openxmlformats.org/drawingml/2006/main" xmlns:r="http://schemas.openxmlformats.org/officeDocument/2006/relationships" xmlns:p="http://schemas.openxmlformats.org/presentationml/2006/main">
+  <p:cSld>
+    <p:spTree>
+      <p:nvGrpSpPr>
+        <p:cNvPr id="1" name=""/>
+        <p:cNvGrpSpPr/>
+        <p:nvPr/>
+      </p:nvGrpSpPr>
+      <p:grpSpPr>
+        <a:xfrm>
+          <a:off x="0" y="0"/>
+          <a:ext cx="0" cy="0"/>
+          <a:chOff x="0" y="0"/>
+          <a:chExt cx="0" cy="0"/>
+        </a:xfrm>
+      </p:grpSpPr>
+      <p:sp>
+        <p:nvSpPr>
+          <p:cNvPr id="4" name="3 CuadroTexto"/>
+          <p:cNvSpPr txBox="1"/>
+          <p:nvPr/>
+        </p:nvSpPr>
+        <p:spPr>
+          <a:xfrm>
+            <a:off x="0" y="404664"/>
+            <a:ext cx="9144000" cy="830997"/>
+          </a:xfrm>
+          <a:prstGeom prst="rect">
+            <a:avLst/>
+          </a:prstGeom>
+          <a:noFill/>
+        </p:spPr>
+        <p:txBody>
+          <a:bodyPr wrap="square" rtlCol="0">
+            <a:spAutoFit/>
+          </a:bodyPr>
+          <a:lstStyle/>
+          <a:p>
+            <a:pPr algn="ctr"/>
+            <a:r>
+              <a:rPr lang="es-ES" sz="4800" dirty="0" smtClean="0">
+                <a:solidFill>
+                  <a:schemeClr val="bg1">
+                    <a:lumMod val="50000"/>
+                    <a:lumOff val="50000"/>
+                  </a:schemeClr>
+                </a:solidFill>
+              </a:rPr>
+              <a:t>GIT</a:t>
+            </a:r>
+            <a:r>
+              <a:rPr lang="es-ES" sz="4800" dirty="0" smtClean="0"/>
+              <a:t> </a:t>
+            </a:r>
+            <a:r>
+              <a:rPr lang="es-ES" sz="4800" dirty="0" err="1" smtClean="0"/>
+              <a:t>commands</a:t>
+            </a:r>
+            <a:endParaRPr lang="ca-ES" sz="4800" dirty="0"/>
+          </a:p>
+        </p:txBody>
+      </p:sp>
+      <p:sp>
+        <p:nvSpPr>
+          <p:cNvPr id="2" name="1 Rectángulo"/>
+          <p:cNvSpPr/>
+          <p:nvPr/>
+        </p:nvSpPr>
+        <p:spPr>
+          <a:xfrm>
+            <a:off x="2715884" y="6488668"/>
+            <a:ext cx="6417334" cy="369332"/>
+          </a:xfrm>
+          <a:prstGeom prst="rect">
+            <a:avLst/>
+          </a:prstGeom>
+        </p:spPr>
+        <p:txBody>
+          <a:bodyPr wrap="none">
+            <a:spAutoFit/>
+          </a:bodyPr>
+          <a:lstStyle/>
+          <a:p>
+            <a:r>
+              <a:rPr lang="ca-ES" dirty="0">
+                <a:solidFill>
+                  <a:schemeClr val="bg1">
+                    <a:lumMod val="50000"/>
+                    <a:lumOff val="50000"/>
+                  </a:schemeClr>
+                </a:solidFill>
+              </a:rPr>
+              <a:t>https://git-scm.com/book/id/v2/Git-Basics-Working-with-Remotes</a:t>
+            </a:r>
+            <a:endParaRPr lang="ca-ES" dirty="0">
+              <a:solidFill>
+                <a:schemeClr val="bg1">
+                  <a:lumMod val="50000"/>
+                  <a:lumOff val="50000"/>
+                </a:schemeClr>
+              </a:solidFill>
+            </a:endParaRPr>
+          </a:p>
+        </p:txBody>
+      </p:sp>
+      <p:sp>
+        <p:nvSpPr>
+          <p:cNvPr id="3" name="2 Rectángulo"/>
+          <p:cNvSpPr/>
+          <p:nvPr/>
+        </p:nvSpPr>
+        <p:spPr>
+          <a:xfrm>
+            <a:off x="0" y="3196720"/>
+            <a:ext cx="9144000" cy="523220"/>
+          </a:xfrm>
+          <a:prstGeom prst="rect">
+            <a:avLst/>
+          </a:prstGeom>
+        </p:spPr>
+        <p:txBody>
+          <a:bodyPr wrap="square">
+            <a:spAutoFit/>
+          </a:bodyPr>
+          <a:lstStyle/>
+          <a:p>
+            <a:pPr algn="ctr"/>
+            <a:r>
+              <a:rPr lang="es-ES" sz="2800" dirty="0" err="1"/>
+              <a:t>git</a:t>
+            </a:r>
+            <a:r>
+              <a:rPr lang="es-ES" sz="2800" dirty="0"/>
+              <a:t> </a:t>
+            </a:r>
+            <a:r>
+              <a:rPr lang="es-ES" sz="2800" dirty="0" err="1" smtClean="0"/>
+              <a:t>push</a:t>
+            </a:r>
+            <a:r>
+              <a:rPr lang="es-ES" sz="2800" dirty="0" smtClean="0"/>
+              <a:t> </a:t>
+            </a:r>
+            <a:r>
+              <a:rPr lang="es-ES" sz="2800" i="1" dirty="0" smtClean="0"/>
+              <a:t>[</a:t>
+            </a:r>
+            <a:r>
+              <a:rPr lang="es-ES" sz="2800" i="1" dirty="0" err="1" smtClean="0"/>
+              <a:t>remote</a:t>
+            </a:r>
+            <a:r>
+              <a:rPr lang="es-ES" sz="2800" i="1" dirty="0" smtClean="0"/>
+              <a:t>] [</a:t>
+            </a:r>
+            <a:r>
+              <a:rPr lang="es-ES" sz="2800" i="1" dirty="0" err="1" smtClean="0"/>
+              <a:t>branch</a:t>
+            </a:r>
+            <a:r>
+              <a:rPr lang="es-ES" sz="2800" i="1" dirty="0" smtClean="0"/>
+              <a:t>]</a:t>
+            </a:r>
+            <a:endParaRPr lang="es-ES" sz="2800" i="1" dirty="0"/>
+          </a:p>
+        </p:txBody>
+      </p:sp>
+      <p:sp>
+        <p:nvSpPr>
+          <p:cNvPr id="6" name="5 CuadroTexto"/>
+          <p:cNvSpPr txBox="1"/>
+          <p:nvPr/>
+        </p:nvSpPr>
+        <p:spPr>
+          <a:xfrm>
+            <a:off x="0" y="2207436"/>
+            <a:ext cx="9144000" cy="830997"/>
+          </a:xfrm>
+          <a:prstGeom prst="rect">
+            <a:avLst/>
+          </a:prstGeom>
+          <a:noFill/>
+        </p:spPr>
+        <p:txBody>
+          <a:bodyPr wrap="square" rtlCol="0">
+            <a:spAutoFit/>
+          </a:bodyPr>
+          <a:lstStyle/>
+          <a:p>
+            <a:pPr algn="ctr"/>
+            <a:r>
+              <a:rPr lang="es-ES" sz="4800" dirty="0" err="1" smtClean="0"/>
+              <a:t>push</a:t>
+            </a:r>
+            <a:r>
+              <a:rPr lang="es-ES" sz="4800" dirty="0" smtClean="0"/>
+              <a:t> </a:t>
+            </a:r>
+            <a:r>
+              <a:rPr lang="es-ES" sz="4800" dirty="0" err="1" smtClean="0"/>
+              <a:t>your</a:t>
+            </a:r>
+            <a:r>
+              <a:rPr lang="es-ES" sz="4800" dirty="0" smtClean="0"/>
+              <a:t> </a:t>
+            </a:r>
+            <a:r>
+              <a:rPr lang="es-ES" sz="4800" dirty="0" err="1" smtClean="0"/>
+              <a:t>changes</a:t>
+            </a:r>
+            <a:endParaRPr lang="ca-ES" sz="4800" dirty="0"/>
+          </a:p>
+        </p:txBody>
+      </p:sp>
+    </p:spTree>
+    <p:extLst>
+      <p:ext uri="{BB962C8B-B14F-4D97-AF65-F5344CB8AC3E}">
+        <p14:creationId xmlns:p14="http://schemas.microsoft.com/office/powerpoint/2010/main" val="2294945662"/>
+      </p:ext>
+    </p:extLst>
+  </p:cSld>
+  <p:clrMapOvr>
+    <a:masterClrMapping/>
+  </p:clrMapOvr>
+  <p:timing>
+    <p:tnLst>
+      <p:par>
+        <p:cTn id="1" dur="indefinite" restart="never" nodeType="tmRoot"/>
+      </p:par>
+    </p:tnLst>
+  </p:timing>
+</p:sld>
+</file>
+
+<file path=ppt/slides/slide29.xml><?xml version="1.0" encoding="utf-8"?>
+<p:sld xmlns:a="http://schemas.openxmlformats.org/drawingml/2006/main" xmlns:r="http://schemas.openxmlformats.org/officeDocument/2006/relationships" xmlns:p="http://schemas.openxmlformats.org/presentationml/2006/main">
+  <p:cSld>
+    <p:spTree>
+      <p:nvGrpSpPr>
+        <p:cNvPr id="1" name=""/>
+        <p:cNvGrpSpPr/>
+        <p:nvPr/>
+      </p:nvGrpSpPr>
+      <p:grpSpPr>
+        <a:xfrm>
+          <a:off x="0" y="0"/>
+          <a:ext cx="0" cy="0"/>
+          <a:chOff x="0" y="0"/>
+          <a:chExt cx="0" cy="0"/>
+        </a:xfrm>
+      </p:grpSpPr>
+      <p:sp>
+        <p:nvSpPr>
+          <p:cNvPr id="4" name="3 CuadroTexto"/>
+          <p:cNvSpPr txBox="1"/>
+          <p:nvPr/>
+        </p:nvSpPr>
+        <p:spPr>
+          <a:xfrm>
+            <a:off x="0" y="404664"/>
+            <a:ext cx="9144000" cy="830997"/>
+          </a:xfrm>
+          <a:prstGeom prst="rect">
+            <a:avLst/>
+          </a:prstGeom>
+          <a:noFill/>
+        </p:spPr>
+        <p:txBody>
+          <a:bodyPr wrap="square" rtlCol="0">
+            <a:spAutoFit/>
+          </a:bodyPr>
+          <a:lstStyle/>
+          <a:p>
+            <a:pPr algn="ctr"/>
+            <a:r>
+              <a:rPr lang="es-ES" sz="4800" dirty="0" smtClean="0">
+                <a:solidFill>
+                  <a:schemeClr val="bg1">
+                    <a:lumMod val="50000"/>
+                    <a:lumOff val="50000"/>
+                  </a:schemeClr>
+                </a:solidFill>
+              </a:rPr>
+              <a:t>GIT</a:t>
+            </a:r>
+            <a:r>
+              <a:rPr lang="es-ES" sz="4800" dirty="0" smtClean="0"/>
+              <a:t> </a:t>
+            </a:r>
+            <a:r>
+              <a:rPr lang="es-ES" sz="4800" dirty="0" err="1" smtClean="0"/>
+              <a:t>glossary</a:t>
+            </a:r>
+            <a:endParaRPr lang="ca-ES" sz="4800" dirty="0"/>
+          </a:p>
+        </p:txBody>
+      </p:sp>
+      <p:sp>
+        <p:nvSpPr>
+          <p:cNvPr id="22" name="21 CuadroTexto"/>
+          <p:cNvSpPr txBox="1"/>
+          <p:nvPr/>
+        </p:nvSpPr>
+        <p:spPr>
+          <a:xfrm>
+            <a:off x="0" y="2207436"/>
+            <a:ext cx="9144000" cy="830997"/>
+          </a:xfrm>
+          <a:prstGeom prst="rect">
+            <a:avLst/>
+          </a:prstGeom>
+          <a:noFill/>
+        </p:spPr>
+        <p:txBody>
+          <a:bodyPr wrap="square" rtlCol="0">
+            <a:spAutoFit/>
+          </a:bodyPr>
+          <a:lstStyle/>
+          <a:p>
+            <a:pPr algn="ctr"/>
+            <a:r>
+              <a:rPr lang="es-ES" sz="4800" dirty="0" err="1" smtClean="0"/>
+              <a:t>pull</a:t>
+            </a:r>
+            <a:endParaRPr lang="ca-ES" sz="4800" dirty="0"/>
+          </a:p>
+        </p:txBody>
+      </p:sp>
+      <p:sp>
+        <p:nvSpPr>
+          <p:cNvPr id="2" name="1 Rectángulo"/>
+          <p:cNvSpPr/>
+          <p:nvPr/>
+        </p:nvSpPr>
+        <p:spPr>
+          <a:xfrm>
+            <a:off x="5494475" y="6488668"/>
+            <a:ext cx="3649525" cy="369332"/>
+          </a:xfrm>
+          <a:prstGeom prst="rect">
+            <a:avLst/>
+          </a:prstGeom>
+        </p:spPr>
+        <p:txBody>
+          <a:bodyPr wrap="none">
+            <a:spAutoFit/>
+          </a:bodyPr>
+          <a:lstStyle/>
+          <a:p>
+            <a:r>
+              <a:rPr lang="ca-ES" dirty="0" smtClean="0">
+                <a:solidFill>
+                  <a:schemeClr val="bg1">
+                    <a:lumMod val="50000"/>
+                    <a:lumOff val="50000"/>
+                  </a:schemeClr>
+                </a:solidFill>
+              </a:rPr>
+              <a:t>https://git-scm.com/docs/gitglossary</a:t>
+            </a:r>
+            <a:endParaRPr lang="ca-ES" dirty="0">
+              <a:solidFill>
+                <a:schemeClr val="bg1">
+                  <a:lumMod val="50000"/>
+                  <a:lumOff val="50000"/>
+                </a:schemeClr>
+              </a:solidFill>
+            </a:endParaRPr>
+          </a:p>
+        </p:txBody>
+      </p:sp>
+      <p:sp>
+        <p:nvSpPr>
+          <p:cNvPr id="3" name="2 Rectángulo"/>
+          <p:cNvSpPr/>
+          <p:nvPr/>
+        </p:nvSpPr>
+        <p:spPr>
+          <a:xfrm>
+            <a:off x="1106615" y="3248610"/>
+            <a:ext cx="6930770" cy="523220"/>
+          </a:xfrm>
+          <a:prstGeom prst="rect">
+            <a:avLst/>
+          </a:prstGeom>
+        </p:spPr>
+        <p:txBody>
+          <a:bodyPr wrap="square">
+            <a:spAutoFit/>
+          </a:bodyPr>
+          <a:lstStyle/>
+          <a:p>
+            <a:pPr algn="ctr"/>
+            <a:r>
+              <a:rPr lang="en-US" sz="2800" dirty="0" smtClean="0"/>
+              <a:t>To</a:t>
+            </a:r>
+            <a:r>
+              <a:rPr lang="en-US" sz="2800" dirty="0"/>
+              <a:t> fetch </a:t>
+            </a:r>
+            <a:r>
+              <a:rPr lang="en-US" sz="2800" dirty="0" smtClean="0"/>
+              <a:t>a branch and</a:t>
+            </a:r>
+            <a:r>
+              <a:rPr lang="en-US" sz="2800" dirty="0"/>
+              <a:t> merge it.</a:t>
+            </a:r>
+            <a:endParaRPr lang="ca-ES" sz="2800" dirty="0"/>
+          </a:p>
+        </p:txBody>
+      </p:sp>
+    </p:spTree>
+    <p:extLst>
+      <p:ext uri="{BB962C8B-B14F-4D97-AF65-F5344CB8AC3E}">
+        <p14:creationId xmlns:p14="http://schemas.microsoft.com/office/powerpoint/2010/main" val="3345413051"/>
       </p:ext>
     </p:extLst>
   </p:cSld>
@@ -7824,6 +8666,249 @@
     <p:extLst>
       <p:ext uri="{BB962C8B-B14F-4D97-AF65-F5344CB8AC3E}">
         <p14:creationId xmlns:p14="http://schemas.microsoft.com/office/powerpoint/2010/main" val="1192288925"/>
+      </p:ext>
+    </p:extLst>
+  </p:cSld>
+  <p:clrMapOvr>
+    <a:masterClrMapping/>
+  </p:clrMapOvr>
+  <p:timing>
+    <p:tnLst>
+      <p:par>
+        <p:cTn id="1" dur="indefinite" restart="never" nodeType="tmRoot"/>
+      </p:par>
+    </p:tnLst>
+  </p:timing>
+</p:sld>
+</file>
+
+<file path=ppt/slides/slide30.xml><?xml version="1.0" encoding="utf-8"?>
+<p:sld xmlns:a="http://schemas.openxmlformats.org/drawingml/2006/main" xmlns:r="http://schemas.openxmlformats.org/officeDocument/2006/relationships" xmlns:p="http://schemas.openxmlformats.org/presentationml/2006/main">
+  <p:cSld>
+    <p:spTree>
+      <p:nvGrpSpPr>
+        <p:cNvPr id="1" name=""/>
+        <p:cNvGrpSpPr/>
+        <p:nvPr/>
+      </p:nvGrpSpPr>
+      <p:grpSpPr>
+        <a:xfrm>
+          <a:off x="0" y="0"/>
+          <a:ext cx="0" cy="0"/>
+          <a:chOff x="0" y="0"/>
+          <a:chExt cx="0" cy="0"/>
+        </a:xfrm>
+      </p:grpSpPr>
+      <p:sp>
+        <p:nvSpPr>
+          <p:cNvPr id="4" name="3 CuadroTexto"/>
+          <p:cNvSpPr txBox="1"/>
+          <p:nvPr/>
+        </p:nvSpPr>
+        <p:spPr>
+          <a:xfrm>
+            <a:off x="0" y="404664"/>
+            <a:ext cx="9144000" cy="830997"/>
+          </a:xfrm>
+          <a:prstGeom prst="rect">
+            <a:avLst/>
+          </a:prstGeom>
+          <a:noFill/>
+        </p:spPr>
+        <p:txBody>
+          <a:bodyPr wrap="square" rtlCol="0">
+            <a:spAutoFit/>
+          </a:bodyPr>
+          <a:lstStyle/>
+          <a:p>
+            <a:pPr algn="ctr"/>
+            <a:r>
+              <a:rPr lang="es-ES" sz="4800" dirty="0" smtClean="0">
+                <a:solidFill>
+                  <a:schemeClr val="bg1">
+                    <a:lumMod val="50000"/>
+                    <a:lumOff val="50000"/>
+                  </a:schemeClr>
+                </a:solidFill>
+              </a:rPr>
+              <a:t>GIT</a:t>
+            </a:r>
+            <a:r>
+              <a:rPr lang="es-ES" sz="4800" dirty="0" smtClean="0"/>
+              <a:t> </a:t>
+            </a:r>
+            <a:r>
+              <a:rPr lang="es-ES" sz="4800" dirty="0" err="1" smtClean="0"/>
+              <a:t>commands</a:t>
+            </a:r>
+            <a:endParaRPr lang="ca-ES" sz="4800" dirty="0"/>
+          </a:p>
+        </p:txBody>
+      </p:sp>
+      <p:sp>
+        <p:nvSpPr>
+          <p:cNvPr id="2" name="1 Rectángulo"/>
+          <p:cNvSpPr/>
+          <p:nvPr/>
+        </p:nvSpPr>
+        <p:spPr>
+          <a:xfrm>
+            <a:off x="2715884" y="6488668"/>
+            <a:ext cx="6417334" cy="369332"/>
+          </a:xfrm>
+          <a:prstGeom prst="rect">
+            <a:avLst/>
+          </a:prstGeom>
+        </p:spPr>
+        <p:txBody>
+          <a:bodyPr wrap="none">
+            <a:spAutoFit/>
+          </a:bodyPr>
+          <a:lstStyle/>
+          <a:p>
+            <a:r>
+              <a:rPr lang="ca-ES" dirty="0">
+                <a:solidFill>
+                  <a:schemeClr val="bg1">
+                    <a:lumMod val="50000"/>
+                    <a:lumOff val="50000"/>
+                  </a:schemeClr>
+                </a:solidFill>
+              </a:rPr>
+              <a:t>https://git-scm.com/book/id/v2/Git-Basics-Working-with-Remotes</a:t>
+            </a:r>
+            <a:endParaRPr lang="ca-ES" dirty="0">
+              <a:solidFill>
+                <a:schemeClr val="bg1">
+                  <a:lumMod val="50000"/>
+                  <a:lumOff val="50000"/>
+                </a:schemeClr>
+              </a:solidFill>
+            </a:endParaRPr>
+          </a:p>
+        </p:txBody>
+      </p:sp>
+      <p:sp>
+        <p:nvSpPr>
+          <p:cNvPr id="3" name="2 Rectángulo"/>
+          <p:cNvSpPr/>
+          <p:nvPr/>
+        </p:nvSpPr>
+        <p:spPr>
+          <a:xfrm>
+            <a:off x="0" y="3196720"/>
+            <a:ext cx="9144000" cy="523220"/>
+          </a:xfrm>
+          <a:prstGeom prst="rect">
+            <a:avLst/>
+          </a:prstGeom>
+        </p:spPr>
+        <p:txBody>
+          <a:bodyPr wrap="square">
+            <a:spAutoFit/>
+          </a:bodyPr>
+          <a:lstStyle/>
+          <a:p>
+            <a:pPr algn="ctr"/>
+            <a:r>
+              <a:rPr lang="es-ES" sz="2800" dirty="0" err="1"/>
+              <a:t>git</a:t>
+            </a:r>
+            <a:r>
+              <a:rPr lang="es-ES" sz="2800" dirty="0"/>
+              <a:t> </a:t>
+            </a:r>
+            <a:r>
+              <a:rPr lang="es-ES" sz="2800" dirty="0" err="1" smtClean="0"/>
+              <a:t>pull</a:t>
+            </a:r>
+            <a:r>
+              <a:rPr lang="es-ES" sz="2800" dirty="0" smtClean="0"/>
+              <a:t> </a:t>
+            </a:r>
+            <a:r>
+              <a:rPr lang="es-ES" sz="2800" i="1" dirty="0" smtClean="0"/>
+              <a:t>[</a:t>
+            </a:r>
+            <a:r>
+              <a:rPr lang="es-ES" sz="2800" i="1" dirty="0" err="1" smtClean="0"/>
+              <a:t>remote</a:t>
+            </a:r>
+            <a:r>
+              <a:rPr lang="es-ES" sz="2800" i="1" dirty="0" smtClean="0"/>
+              <a:t>] [</a:t>
+            </a:r>
+            <a:r>
+              <a:rPr lang="es-ES" sz="2800" i="1" dirty="0" err="1" smtClean="0"/>
+              <a:t>branch</a:t>
+            </a:r>
+            <a:r>
+              <a:rPr lang="es-ES" sz="2800" i="1" dirty="0" smtClean="0"/>
+              <a:t>]</a:t>
+            </a:r>
+            <a:endParaRPr lang="es-ES" sz="2800" i="1" dirty="0"/>
+          </a:p>
+        </p:txBody>
+      </p:sp>
+      <p:sp>
+        <p:nvSpPr>
+          <p:cNvPr id="6" name="5 CuadroTexto"/>
+          <p:cNvSpPr txBox="1"/>
+          <p:nvPr/>
+        </p:nvSpPr>
+        <p:spPr>
+          <a:xfrm>
+            <a:off x="0" y="2207436"/>
+            <a:ext cx="9144000" cy="830997"/>
+          </a:xfrm>
+          <a:prstGeom prst="rect">
+            <a:avLst/>
+          </a:prstGeom>
+          <a:noFill/>
+        </p:spPr>
+        <p:txBody>
+          <a:bodyPr wrap="square" rtlCol="0">
+            <a:spAutoFit/>
+          </a:bodyPr>
+          <a:lstStyle/>
+          <a:p>
+            <a:pPr algn="ctr"/>
+            <a:r>
+              <a:rPr lang="es-ES" sz="4800" dirty="0" err="1" smtClean="0"/>
+              <a:t>pull</a:t>
+            </a:r>
+            <a:r>
+              <a:rPr lang="es-ES" sz="4800" dirty="0" smtClean="0"/>
+              <a:t> </a:t>
+            </a:r>
+            <a:r>
+              <a:rPr lang="es-ES" sz="4800" dirty="0" err="1" smtClean="0"/>
+              <a:t>changes</a:t>
+            </a:r>
+            <a:r>
+              <a:rPr lang="es-ES" sz="4800" dirty="0" smtClean="0"/>
+              <a:t> </a:t>
+            </a:r>
+            <a:r>
+              <a:rPr lang="es-ES" sz="4800" dirty="0" err="1" smtClean="0"/>
+              <a:t>from</a:t>
+            </a:r>
+            <a:r>
+              <a:rPr lang="es-ES" sz="4800" dirty="0" smtClean="0"/>
+              <a:t> </a:t>
+            </a:r>
+            <a:r>
+              <a:rPr lang="es-ES" sz="4800" dirty="0" err="1" smtClean="0"/>
+              <a:t>remote</a:t>
+            </a:r>
+            <a:endParaRPr lang="ca-ES" sz="4800" dirty="0"/>
+          </a:p>
+        </p:txBody>
+      </p:sp>
+    </p:spTree>
+    <p:extLst>
+      <p:ext uri="{BB962C8B-B14F-4D97-AF65-F5344CB8AC3E}">
+        <p14:creationId xmlns:p14="http://schemas.microsoft.com/office/powerpoint/2010/main" val="3333174649"/>
       </p:ext>
     </p:extLst>
   </p:cSld>

</xml_diff>

<commit_message>
Add a last slide with a clone to the slides at GitHub
</commit_message>
<xml_diff>
--- a/From CVS to GIT.pptx
+++ b/From CVS to GIT.pptx
@@ -35,6 +35,7 @@
     <p:sldId id="285" r:id="rId29"/>
     <p:sldId id="274" r:id="rId30"/>
     <p:sldId id="286" r:id="rId31"/>
+    <p:sldId id="287" r:id="rId32"/>
   </p:sldIdLst>
   <p:sldSz cx="9144000" cy="6858000" type="screen4x3"/>
   <p:notesSz cx="6858000" cy="9144000"/>
@@ -317,7 +318,7 @@
           <a:p>
             <a:fld id="{AA67AB52-751A-447E-9F7C-2F1F1E6CEC1D}" type="datetimeFigureOut">
               <a:rPr lang="ca-ES" smtClean="0"/>
-              <a:t>17/2/2017</a:t>
+              <a:t>20/2/2017</a:t>
             </a:fld>
             <a:endParaRPr lang="ca-ES"/>
           </a:p>
@@ -487,7 +488,7 @@
           <a:p>
             <a:fld id="{AA67AB52-751A-447E-9F7C-2F1F1E6CEC1D}" type="datetimeFigureOut">
               <a:rPr lang="ca-ES" smtClean="0"/>
-              <a:t>17/2/2017</a:t>
+              <a:t>20/2/2017</a:t>
             </a:fld>
             <a:endParaRPr lang="ca-ES"/>
           </a:p>
@@ -667,7 +668,7 @@
           <a:p>
             <a:fld id="{AA67AB52-751A-447E-9F7C-2F1F1E6CEC1D}" type="datetimeFigureOut">
               <a:rPr lang="ca-ES" smtClean="0"/>
-              <a:t>17/2/2017</a:t>
+              <a:t>20/2/2017</a:t>
             </a:fld>
             <a:endParaRPr lang="ca-ES"/>
           </a:p>
@@ -837,7 +838,7 @@
           <a:p>
             <a:fld id="{AA67AB52-751A-447E-9F7C-2F1F1E6CEC1D}" type="datetimeFigureOut">
               <a:rPr lang="ca-ES" smtClean="0"/>
-              <a:t>17/2/2017</a:t>
+              <a:t>20/2/2017</a:t>
             </a:fld>
             <a:endParaRPr lang="ca-ES"/>
           </a:p>
@@ -1083,7 +1084,7 @@
           <a:p>
             <a:fld id="{AA67AB52-751A-447E-9F7C-2F1F1E6CEC1D}" type="datetimeFigureOut">
               <a:rPr lang="ca-ES" smtClean="0"/>
-              <a:t>17/2/2017</a:t>
+              <a:t>20/2/2017</a:t>
             </a:fld>
             <a:endParaRPr lang="ca-ES"/>
           </a:p>
@@ -1371,7 +1372,7 @@
           <a:p>
             <a:fld id="{AA67AB52-751A-447E-9F7C-2F1F1E6CEC1D}" type="datetimeFigureOut">
               <a:rPr lang="ca-ES" smtClean="0"/>
-              <a:t>17/2/2017</a:t>
+              <a:t>20/2/2017</a:t>
             </a:fld>
             <a:endParaRPr lang="ca-ES"/>
           </a:p>
@@ -1793,7 +1794,7 @@
           <a:p>
             <a:fld id="{AA67AB52-751A-447E-9F7C-2F1F1E6CEC1D}" type="datetimeFigureOut">
               <a:rPr lang="ca-ES" smtClean="0"/>
-              <a:t>17/2/2017</a:t>
+              <a:t>20/2/2017</a:t>
             </a:fld>
             <a:endParaRPr lang="ca-ES"/>
           </a:p>
@@ -1911,7 +1912,7 @@
           <a:p>
             <a:fld id="{AA67AB52-751A-447E-9F7C-2F1F1E6CEC1D}" type="datetimeFigureOut">
               <a:rPr lang="ca-ES" smtClean="0"/>
-              <a:t>17/2/2017</a:t>
+              <a:t>20/2/2017</a:t>
             </a:fld>
             <a:endParaRPr lang="ca-ES"/>
           </a:p>
@@ -2006,7 +2007,7 @@
           <a:p>
             <a:fld id="{AA67AB52-751A-447E-9F7C-2F1F1E6CEC1D}" type="datetimeFigureOut">
               <a:rPr lang="ca-ES" smtClean="0"/>
-              <a:t>17/2/2017</a:t>
+              <a:t>20/2/2017</a:t>
             </a:fld>
             <a:endParaRPr lang="ca-ES"/>
           </a:p>
@@ -2283,7 +2284,7 @@
           <a:p>
             <a:fld id="{AA67AB52-751A-447E-9F7C-2F1F1E6CEC1D}" type="datetimeFigureOut">
               <a:rPr lang="ca-ES" smtClean="0"/>
-              <a:t>17/2/2017</a:t>
+              <a:t>20/2/2017</a:t>
             </a:fld>
             <a:endParaRPr lang="ca-ES"/>
           </a:p>
@@ -2536,7 +2537,7 @@
           <a:p>
             <a:fld id="{AA67AB52-751A-447E-9F7C-2F1F1E6CEC1D}" type="datetimeFigureOut">
               <a:rPr lang="ca-ES" smtClean="0"/>
-              <a:t>17/2/2017</a:t>
+              <a:t>20/2/2017</a:t>
             </a:fld>
             <a:endParaRPr lang="ca-ES"/>
           </a:p>
@@ -2749,7 +2750,7 @@
           <a:p>
             <a:fld id="{AA67AB52-751A-447E-9F7C-2F1F1E6CEC1D}" type="datetimeFigureOut">
               <a:rPr lang="ca-ES" smtClean="0"/>
-              <a:t>17/2/2017</a:t>
+              <a:t>20/2/2017</a:t>
             </a:fld>
             <a:endParaRPr lang="ca-ES"/>
           </a:p>
@@ -3132,7 +3133,7 @@
         </p:nvSpPr>
         <p:spPr>
           <a:xfrm>
-            <a:off x="0" y="2054458"/>
+            <a:off x="-107504" y="2054458"/>
             <a:ext cx="9144000" cy="1446550"/>
           </a:xfrm>
           <a:prstGeom prst="rect">
@@ -5024,14 +5025,6 @@
               </a:rPr>
               <a:t>https://git-scm.com/book/id/v2/Getting-Started-First-Time-Git-Setup</a:t>
             </a:r>
-            <a:endParaRPr lang="ca-ES" dirty="0">
-              <a:solidFill>
-                <a:schemeClr val="bg1">
-                  <a:lumMod val="50000"/>
-                  <a:lumOff val="50000"/>
-                </a:schemeClr>
-              </a:solidFill>
-            </a:endParaRPr>
           </a:p>
         </p:txBody>
       </p:sp>
@@ -5288,14 +5281,6 @@
               </a:rPr>
               <a:t>https://git-scm.com/book/id/v2/Getting-Started-First-Time-Git-Setup</a:t>
             </a:r>
-            <a:endParaRPr lang="ca-ES" dirty="0">
-              <a:solidFill>
-                <a:schemeClr val="bg1">
-                  <a:lumMod val="50000"/>
-                  <a:lumOff val="50000"/>
-                </a:schemeClr>
-              </a:solidFill>
-            </a:endParaRPr>
           </a:p>
         </p:txBody>
       </p:sp>
@@ -5511,14 +5496,6 @@
               </a:rPr>
               <a:t>https://git-scm.com/book/id/v2/Getting-Started-Getting-Help</a:t>
             </a:r>
-            <a:endParaRPr lang="ca-ES" dirty="0">
-              <a:solidFill>
-                <a:schemeClr val="bg1">
-                  <a:lumMod val="50000"/>
-                  <a:lumOff val="50000"/>
-                </a:schemeClr>
-              </a:solidFill>
-            </a:endParaRPr>
           </a:p>
         </p:txBody>
       </p:sp>
@@ -5718,14 +5695,6 @@
               </a:rPr>
               <a:t>https://git-scm.com/book/id/v2/Git-Basics-Getting-a-Git-Repository</a:t>
             </a:r>
-            <a:endParaRPr lang="ca-ES" dirty="0">
-              <a:solidFill>
-                <a:schemeClr val="bg1">
-                  <a:lumMod val="50000"/>
-                  <a:lumOff val="50000"/>
-                </a:schemeClr>
-              </a:solidFill>
-            </a:endParaRPr>
           </a:p>
         </p:txBody>
       </p:sp>
@@ -6278,14 +6247,6 @@
               </a:rPr>
               <a:t>https://git-scm.com/book/id/v2/Git-Basics-Getting-a-Git-Repository</a:t>
             </a:r>
-            <a:endParaRPr lang="ca-ES" dirty="0">
-              <a:solidFill>
-                <a:schemeClr val="bg1">
-                  <a:lumMod val="50000"/>
-                  <a:lumOff val="50000"/>
-                </a:schemeClr>
-              </a:solidFill>
-            </a:endParaRPr>
           </a:p>
         </p:txBody>
       </p:sp>
@@ -6404,14 +6365,6 @@
               </a:rPr>
               <a:t>https://git-scm.com/book/id/v2/Git-Basics-Getting-a-Git-Repository</a:t>
             </a:r>
-            <a:endParaRPr lang="ca-ES" dirty="0">
-              <a:solidFill>
-                <a:schemeClr val="bg1">
-                  <a:lumMod val="50000"/>
-                  <a:lumOff val="50000"/>
-                </a:schemeClr>
-              </a:solidFill>
-            </a:endParaRPr>
           </a:p>
         </p:txBody>
       </p:sp>
@@ -6791,14 +6744,6 @@
               </a:rPr>
               <a:t>https://git-scm.com/book/id/v2/Git-Basics-Recording-Changes-to-the-Repository</a:t>
             </a:r>
-            <a:endParaRPr lang="ca-ES" dirty="0">
-              <a:solidFill>
-                <a:schemeClr val="bg1">
-                  <a:lumMod val="50000"/>
-                  <a:lumOff val="50000"/>
-                </a:schemeClr>
-              </a:solidFill>
-            </a:endParaRPr>
           </a:p>
         </p:txBody>
       </p:sp>
@@ -6958,14 +6903,6 @@
               </a:rPr>
               <a:t>https://git-scm.com/book/id/v2/Git-Basics-Getting-a-Git-Repository</a:t>
             </a:r>
-            <a:endParaRPr lang="ca-ES" dirty="0">
-              <a:solidFill>
-                <a:schemeClr val="bg1">
-                  <a:lumMod val="50000"/>
-                  <a:lumOff val="50000"/>
-                </a:schemeClr>
-              </a:solidFill>
-            </a:endParaRPr>
           </a:p>
         </p:txBody>
       </p:sp>
@@ -7184,14 +7121,6 @@
               </a:rPr>
               <a:t>https://git-scm.com/book/id/v2/Git-Basics-Viewing-the-Commit-History</a:t>
             </a:r>
-            <a:endParaRPr lang="ca-ES" dirty="0">
-              <a:solidFill>
-                <a:schemeClr val="bg1">
-                  <a:lumMod val="50000"/>
-                  <a:lumOff val="50000"/>
-                </a:schemeClr>
-              </a:solidFill>
-            </a:endParaRPr>
           </a:p>
         </p:txBody>
       </p:sp>
@@ -7461,15 +7390,7 @@
             <a:pPr algn="ctr"/>
             <a:r>
               <a:rPr lang="en-US" sz="2800" dirty="0"/>
-              <a:t>A </a:t>
-            </a:r>
-            <a:r>
-              <a:rPr lang="en-US" sz="2800" dirty="0"/>
-              <a:t>repository</a:t>
-            </a:r>
-            <a:r>
-              <a:rPr lang="en-US" sz="2800" dirty="0"/>
-              <a:t> which is used to track the same project but resides somewhere else</a:t>
+              <a:t>A repository which is used to track the same project but resides somewhere else</a:t>
             </a:r>
             <a:r>
               <a:rPr lang="en-US" sz="2800" dirty="0" smtClean="0"/>
@@ -7594,14 +7515,6 @@
               </a:rPr>
               <a:t>https://git-scm.com/book/id/v2/Git-Basics-Working-with-Remotes</a:t>
             </a:r>
-            <a:endParaRPr lang="ca-ES" dirty="0">
-              <a:solidFill>
-                <a:schemeClr val="bg1">
-                  <a:lumMod val="50000"/>
-                  <a:lumOff val="50000"/>
-                </a:schemeClr>
-              </a:solidFill>
-            </a:endParaRPr>
           </a:p>
         </p:txBody>
       </p:sp>
@@ -8187,14 +8100,6 @@
               </a:rPr>
               <a:t>https://git-scm.com/book/id/v2/Git-Basics-Working-with-Remotes</a:t>
             </a:r>
-            <a:endParaRPr lang="ca-ES" dirty="0">
-              <a:solidFill>
-                <a:schemeClr val="bg1">
-                  <a:lumMod val="50000"/>
-                  <a:lumOff val="50000"/>
-                </a:schemeClr>
-              </a:solidFill>
-            </a:endParaRPr>
           </a:p>
         </p:txBody>
       </p:sp>
@@ -8777,14 +8682,6 @@
               </a:rPr>
               <a:t>https://git-scm.com/book/id/v2/Git-Basics-Working-with-Remotes</a:t>
             </a:r>
-            <a:endParaRPr lang="ca-ES" dirty="0">
-              <a:solidFill>
-                <a:schemeClr val="bg1">
-                  <a:lumMod val="50000"/>
-                  <a:lumOff val="50000"/>
-                </a:schemeClr>
-              </a:solidFill>
-            </a:endParaRPr>
           </a:p>
         </p:txBody>
       </p:sp>
@@ -8909,6 +8806,165 @@
     <p:extLst>
       <p:ext uri="{BB962C8B-B14F-4D97-AF65-F5344CB8AC3E}">
         <p14:creationId xmlns:p14="http://schemas.microsoft.com/office/powerpoint/2010/main" val="3333174649"/>
+      </p:ext>
+    </p:extLst>
+  </p:cSld>
+  <p:clrMapOvr>
+    <a:masterClrMapping/>
+  </p:clrMapOvr>
+  <p:timing>
+    <p:tnLst>
+      <p:par>
+        <p:cTn id="1" dur="indefinite" restart="never" nodeType="tmRoot"/>
+      </p:par>
+    </p:tnLst>
+  </p:timing>
+</p:sld>
+</file>
+
+<file path=ppt/slides/slide31.xml><?xml version="1.0" encoding="utf-8"?>
+<p:sld xmlns:a="http://schemas.openxmlformats.org/drawingml/2006/main" xmlns:r="http://schemas.openxmlformats.org/officeDocument/2006/relationships" xmlns:p="http://schemas.openxmlformats.org/presentationml/2006/main">
+  <p:cSld>
+    <p:spTree>
+      <p:nvGrpSpPr>
+        <p:cNvPr id="1" name=""/>
+        <p:cNvGrpSpPr/>
+        <p:nvPr/>
+      </p:nvGrpSpPr>
+      <p:grpSpPr>
+        <a:xfrm>
+          <a:off x="0" y="0"/>
+          <a:ext cx="0" cy="0"/>
+          <a:chOff x="0" y="0"/>
+          <a:chExt cx="0" cy="0"/>
+        </a:xfrm>
+      </p:grpSpPr>
+      <p:sp>
+        <p:nvSpPr>
+          <p:cNvPr id="3" name="2 Rectángulo"/>
+          <p:cNvSpPr/>
+          <p:nvPr/>
+        </p:nvSpPr>
+        <p:spPr>
+          <a:xfrm>
+            <a:off x="0" y="3196720"/>
+            <a:ext cx="9144000" cy="523220"/>
+          </a:xfrm>
+          <a:prstGeom prst="rect">
+            <a:avLst/>
+          </a:prstGeom>
+        </p:spPr>
+        <p:txBody>
+          <a:bodyPr wrap="square">
+            <a:spAutoFit/>
+          </a:bodyPr>
+          <a:lstStyle/>
+          <a:p>
+            <a:pPr algn="ctr"/>
+            <a:r>
+              <a:rPr lang="es-ES" sz="2800" dirty="0" err="1"/>
+              <a:t>git</a:t>
+            </a:r>
+            <a:r>
+              <a:rPr lang="es-ES" sz="2800" dirty="0"/>
+              <a:t> </a:t>
+            </a:r>
+            <a:r>
+              <a:rPr lang="es-ES" sz="2800" dirty="0"/>
+              <a:t>clone https://github.com/rocboronat/from-cvs-to-git</a:t>
+            </a:r>
+            <a:endParaRPr lang="es-ES" sz="2800" i="1" dirty="0"/>
+          </a:p>
+        </p:txBody>
+      </p:sp>
+      <p:sp>
+        <p:nvSpPr>
+          <p:cNvPr id="6" name="5 CuadroTexto"/>
+          <p:cNvSpPr txBox="1"/>
+          <p:nvPr/>
+        </p:nvSpPr>
+        <p:spPr>
+          <a:xfrm>
+            <a:off x="0" y="2207436"/>
+            <a:ext cx="9144000" cy="830997"/>
+          </a:xfrm>
+          <a:prstGeom prst="rect">
+            <a:avLst/>
+          </a:prstGeom>
+          <a:noFill/>
+        </p:spPr>
+        <p:txBody>
+          <a:bodyPr wrap="square" rtlCol="0">
+            <a:spAutoFit/>
+          </a:bodyPr>
+          <a:lstStyle/>
+          <a:p>
+            <a:pPr algn="ctr"/>
+            <a:r>
+              <a:rPr lang="es-ES" sz="4800" dirty="0" smtClean="0"/>
+              <a:t>clone </a:t>
+            </a:r>
+            <a:r>
+              <a:rPr lang="es-ES" sz="4800" dirty="0" err="1" smtClean="0"/>
+              <a:t>this</a:t>
+            </a:r>
+            <a:r>
+              <a:rPr lang="es-ES" sz="4800" dirty="0" smtClean="0"/>
+              <a:t> </a:t>
+            </a:r>
+            <a:r>
+              <a:rPr lang="es-ES" sz="4800" dirty="0" err="1" smtClean="0"/>
+              <a:t>presentation</a:t>
+            </a:r>
+            <a:endParaRPr lang="ca-ES" sz="4800" dirty="0"/>
+          </a:p>
+        </p:txBody>
+      </p:sp>
+      <p:pic>
+        <p:nvPicPr>
+          <p:cNvPr id="1026" name="Picture 2" descr="C:\Users\Roc Boronat\Desktop\1000px-cc-by-sa_icon-svg.png"/>
+          <p:cNvPicPr>
+            <a:picLocks noChangeAspect="1" noChangeArrowheads="1"/>
+          </p:cNvPicPr>
+          <p:nvPr/>
+        </p:nvPicPr>
+        <p:blipFill>
+          <a:blip r:embed="rId2" cstate="print">
+            <a:extLst>
+              <a:ext uri="{28A0092B-C50C-407E-A947-70E740481C1C}">
+                <a14:useLocalDpi xmlns:a14="http://schemas.microsoft.com/office/drawing/2010/main" val="0"/>
+              </a:ext>
+            </a:extLst>
+          </a:blip>
+          <a:srcRect/>
+          <a:stretch>
+            <a:fillRect/>
+          </a:stretch>
+        </p:blipFill>
+        <p:spPr bwMode="auto">
+          <a:xfrm>
+            <a:off x="3574020" y="5669999"/>
+            <a:ext cx="1995959" cy="702578"/>
+          </a:xfrm>
+          <a:prstGeom prst="rect">
+            <a:avLst/>
+          </a:prstGeom>
+          <a:noFill/>
+          <a:extLst>
+            <a:ext uri="{909E8E84-426E-40DD-AFC4-6F175D3DCCD1}">
+              <a14:hiddenFill xmlns:a14="http://schemas.microsoft.com/office/drawing/2010/main">
+                <a:solidFill>
+                  <a:srgbClr val="FFFFFF"/>
+                </a:solidFill>
+              </a14:hiddenFill>
+            </a:ext>
+          </a:extLst>
+        </p:spPr>
+      </p:pic>
+    </p:spTree>
+    <p:extLst>
+      <p:ext uri="{BB962C8B-B14F-4D97-AF65-F5344CB8AC3E}">
+        <p14:creationId xmlns:p14="http://schemas.microsoft.com/office/powerpoint/2010/main" val="4069222607"/>
       </p:ext>
     </p:extLst>
   </p:cSld>

</xml_diff>

<commit_message>
Explain squash and share some beers at the end
</commit_message>
<xml_diff>
--- a/From CVS to GIT.pptx
+++ b/From CVS to GIT.pptx
@@ -36,6 +36,8 @@
     <p:sldId id="274" r:id="rId30"/>
     <p:sldId id="286" r:id="rId31"/>
     <p:sldId id="287" r:id="rId32"/>
+    <p:sldId id="288" r:id="rId33"/>
+    <p:sldId id="289" r:id="rId34"/>
   </p:sldIdLst>
   <p:sldSz cx="9144000" cy="6858000" type="screen4x3"/>
   <p:notesSz cx="6858000" cy="9144000"/>
@@ -3204,6 +3206,63 @@
           </a:p>
         </p:txBody>
       </p:sp>
+      <p:pic>
+        <p:nvPicPr>
+          <p:cNvPr id="3" name="Picture 2" descr="F:\Pipo\Sync\Google Drive\Fewlaps\Resources\Logos Fewlaps\Fewlaps blanc (fons transparent).png"/>
+          <p:cNvPicPr>
+            <a:picLocks noChangeAspect="1" noChangeArrowheads="1"/>
+          </p:cNvPicPr>
+          <p:nvPr/>
+        </p:nvPicPr>
+        <p:blipFill>
+          <a:blip r:embed="rId2" cstate="print">
+            <a:duotone>
+              <a:schemeClr val="accent6">
+                <a:shade val="45000"/>
+                <a:satMod val="135000"/>
+              </a:schemeClr>
+              <a:prstClr val="white"/>
+            </a:duotone>
+            <a:extLst>
+              <a:ext uri="{BEBA8EAE-BF5A-486C-A8C5-ECC9F3942E4B}">
+                <a14:imgProps xmlns:a14="http://schemas.microsoft.com/office/drawing/2010/main">
+                  <a14:imgLayer r:embed="rId3">
+                    <a14:imgEffect>
+                      <a14:artisticChalkSketch/>
+                    </a14:imgEffect>
+                    <a14:imgEffect>
+                      <a14:sharpenSoften amount="-50000"/>
+                    </a14:imgEffect>
+                    <a14:imgEffect>
+                      <a14:colorTemperature colorTemp="4700"/>
+                    </a14:imgEffect>
+                    <a14:imgEffect>
+                      <a14:saturation sat="400000"/>
+                    </a14:imgEffect>
+                  </a14:imgLayer>
+                </a14:imgProps>
+              </a:ext>
+              <a:ext uri="{28A0092B-C50C-407E-A947-70E740481C1C}">
+                <a14:useLocalDpi xmlns:a14="http://schemas.microsoft.com/office/drawing/2010/main" val="0"/>
+              </a:ext>
+            </a:extLst>
+          </a:blip>
+          <a:srcRect/>
+          <a:stretch>
+            <a:fillRect/>
+          </a:stretch>
+        </p:blipFill>
+        <p:spPr bwMode="auto">
+          <a:xfrm>
+            <a:off x="4001349" y="6222294"/>
+            <a:ext cx="1141301" cy="318067"/>
+          </a:xfrm>
+          <a:prstGeom prst="rect">
+            <a:avLst/>
+          </a:prstGeom>
+          <a:noFill/>
+        </p:spPr>
+      </p:pic>
     </p:spTree>
     <p:extLst>
       <p:ext uri="{BB962C8B-B14F-4D97-AF65-F5344CB8AC3E}">
@@ -8965,6 +9024,295 @@
     <p:extLst>
       <p:ext uri="{BB962C8B-B14F-4D97-AF65-F5344CB8AC3E}">
         <p14:creationId xmlns:p14="http://schemas.microsoft.com/office/powerpoint/2010/main" val="4069222607"/>
+      </p:ext>
+    </p:extLst>
+  </p:cSld>
+  <p:clrMapOvr>
+    <a:masterClrMapping/>
+  </p:clrMapOvr>
+  <p:timing>
+    <p:tnLst>
+      <p:par>
+        <p:cTn id="1" dur="indefinite" restart="never" nodeType="tmRoot"/>
+      </p:par>
+    </p:tnLst>
+  </p:timing>
+</p:sld>
+</file>
+
+<file path=ppt/slides/slide32.xml><?xml version="1.0" encoding="utf-8"?>
+<p:sld xmlns:a="http://schemas.openxmlformats.org/drawingml/2006/main" xmlns:r="http://schemas.openxmlformats.org/officeDocument/2006/relationships" xmlns:p="http://schemas.openxmlformats.org/presentationml/2006/main">
+  <p:cSld>
+    <p:spTree>
+      <p:nvGrpSpPr>
+        <p:cNvPr id="1" name=""/>
+        <p:cNvGrpSpPr/>
+        <p:nvPr/>
+      </p:nvGrpSpPr>
+      <p:grpSpPr>
+        <a:xfrm>
+          <a:off x="0" y="0"/>
+          <a:ext cx="0" cy="0"/>
+          <a:chOff x="0" y="0"/>
+          <a:chExt cx="0" cy="0"/>
+        </a:xfrm>
+      </p:grpSpPr>
+      <p:sp>
+        <p:nvSpPr>
+          <p:cNvPr id="3" name="2 Rectángulo"/>
+          <p:cNvSpPr/>
+          <p:nvPr/>
+        </p:nvSpPr>
+        <p:spPr>
+          <a:xfrm>
+            <a:off x="0" y="3196720"/>
+            <a:ext cx="9144000" cy="523220"/>
+          </a:xfrm>
+          <a:prstGeom prst="rect">
+            <a:avLst/>
+          </a:prstGeom>
+        </p:spPr>
+        <p:txBody>
+          <a:bodyPr wrap="square">
+            <a:spAutoFit/>
+          </a:bodyPr>
+          <a:lstStyle/>
+          <a:p>
+            <a:pPr algn="ctr"/>
+            <a:r>
+              <a:rPr lang="ca-ES" sz="2800" dirty="0"/>
+              <a:t>git </a:t>
+            </a:r>
+            <a:r>
+              <a:rPr lang="ca-ES" sz="2800" dirty="0" err="1"/>
+              <a:t>rebase</a:t>
+            </a:r>
+            <a:r>
+              <a:rPr lang="ca-ES" sz="2800" dirty="0"/>
+              <a:t> -i </a:t>
+            </a:r>
+            <a:r>
+              <a:rPr lang="ca-ES" sz="2800" dirty="0" smtClean="0"/>
+              <a:t>HEAD~3</a:t>
+            </a:r>
+            <a:endParaRPr lang="es-ES" sz="2800" i="1" dirty="0"/>
+          </a:p>
+        </p:txBody>
+      </p:sp>
+      <p:sp>
+        <p:nvSpPr>
+          <p:cNvPr id="6" name="5 CuadroTexto"/>
+          <p:cNvSpPr txBox="1"/>
+          <p:nvPr/>
+        </p:nvSpPr>
+        <p:spPr>
+          <a:xfrm>
+            <a:off x="0" y="2207436"/>
+            <a:ext cx="9144000" cy="830997"/>
+          </a:xfrm>
+          <a:prstGeom prst="rect">
+            <a:avLst/>
+          </a:prstGeom>
+          <a:noFill/>
+        </p:spPr>
+        <p:txBody>
+          <a:bodyPr wrap="square" rtlCol="0">
+            <a:spAutoFit/>
+          </a:bodyPr>
+          <a:lstStyle/>
+          <a:p>
+            <a:pPr algn="ctr"/>
+            <a:r>
+              <a:rPr lang="es-ES" sz="4800" dirty="0" smtClean="0"/>
+              <a:t>and squash </a:t>
+            </a:r>
+            <a:r>
+              <a:rPr lang="es-ES" sz="4800" dirty="0" err="1" smtClean="0"/>
+              <a:t>it</a:t>
+            </a:r>
+            <a:endParaRPr lang="ca-ES" sz="4800" dirty="0"/>
+          </a:p>
+        </p:txBody>
+      </p:sp>
+    </p:spTree>
+    <p:extLst>
+      <p:ext uri="{BB962C8B-B14F-4D97-AF65-F5344CB8AC3E}">
+        <p14:creationId xmlns:p14="http://schemas.microsoft.com/office/powerpoint/2010/main" val="2220969404"/>
+      </p:ext>
+    </p:extLst>
+  </p:cSld>
+  <p:clrMapOvr>
+    <a:masterClrMapping/>
+  </p:clrMapOvr>
+  <p:timing>
+    <p:tnLst>
+      <p:par>
+        <p:cTn id="1" dur="indefinite" restart="never" nodeType="tmRoot"/>
+      </p:par>
+    </p:tnLst>
+  </p:timing>
+</p:sld>
+</file>
+
+<file path=ppt/slides/slide33.xml><?xml version="1.0" encoding="utf-8"?>
+<p:sld xmlns:a="http://schemas.openxmlformats.org/drawingml/2006/main" xmlns:r="http://schemas.openxmlformats.org/officeDocument/2006/relationships" xmlns:p="http://schemas.openxmlformats.org/presentationml/2006/main">
+  <p:cSld>
+    <p:spTree>
+      <p:nvGrpSpPr>
+        <p:cNvPr id="1" name=""/>
+        <p:cNvGrpSpPr/>
+        <p:nvPr/>
+      </p:nvGrpSpPr>
+      <p:grpSpPr>
+        <a:xfrm>
+          <a:off x="0" y="0"/>
+          <a:ext cx="0" cy="0"/>
+          <a:chOff x="0" y="0"/>
+          <a:chExt cx="0" cy="0"/>
+        </a:xfrm>
+      </p:grpSpPr>
+      <p:sp>
+        <p:nvSpPr>
+          <p:cNvPr id="3" name="2 Rectángulo"/>
+          <p:cNvSpPr/>
+          <p:nvPr/>
+        </p:nvSpPr>
+        <p:spPr>
+          <a:xfrm>
+            <a:off x="0" y="3196720"/>
+            <a:ext cx="9144000" cy="523220"/>
+          </a:xfrm>
+          <a:prstGeom prst="rect">
+            <a:avLst/>
+          </a:prstGeom>
+        </p:spPr>
+        <p:txBody>
+          <a:bodyPr wrap="square">
+            <a:spAutoFit/>
+          </a:bodyPr>
+          <a:lstStyle/>
+          <a:p>
+            <a:pPr algn="ctr"/>
+            <a:r>
+              <a:rPr lang="ca-ES" sz="2800" dirty="0"/>
+              <a:t>git </a:t>
+            </a:r>
+            <a:r>
+              <a:rPr lang="ca-ES" sz="2800" dirty="0" err="1" smtClean="0"/>
+              <a:t>help</a:t>
+            </a:r>
+            <a:r>
+              <a:rPr lang="ca-ES" sz="2800" dirty="0" smtClean="0"/>
+              <a:t> </a:t>
+            </a:r>
+            <a:r>
+              <a:rPr lang="ca-ES" sz="2800" dirty="0" err="1" smtClean="0"/>
+              <a:t>beers</a:t>
+            </a:r>
+            <a:endParaRPr lang="es-ES" sz="2800" i="1" dirty="0"/>
+          </a:p>
+        </p:txBody>
+      </p:sp>
+      <p:sp>
+        <p:nvSpPr>
+          <p:cNvPr id="6" name="5 CuadroTexto"/>
+          <p:cNvSpPr txBox="1"/>
+          <p:nvPr/>
+        </p:nvSpPr>
+        <p:spPr>
+          <a:xfrm>
+            <a:off x="0" y="2207436"/>
+            <a:ext cx="9144000" cy="830997"/>
+          </a:xfrm>
+          <a:prstGeom prst="rect">
+            <a:avLst/>
+          </a:prstGeom>
+          <a:noFill/>
+        </p:spPr>
+        <p:txBody>
+          <a:bodyPr wrap="square" rtlCol="0">
+            <a:spAutoFit/>
+          </a:bodyPr>
+          <a:lstStyle/>
+          <a:p>
+            <a:pPr algn="ctr"/>
+            <a:r>
+              <a:rPr lang="es-ES" sz="4800" dirty="0" err="1"/>
+              <a:t>q</a:t>
+            </a:r>
+            <a:r>
+              <a:rPr lang="es-ES" sz="4800" dirty="0" err="1" smtClean="0"/>
+              <a:t>uestions</a:t>
+            </a:r>
+            <a:r>
+              <a:rPr lang="es-ES" sz="4800" dirty="0" smtClean="0"/>
+              <a:t>?</a:t>
+            </a:r>
+            <a:endParaRPr lang="ca-ES" sz="4800" dirty="0"/>
+          </a:p>
+        </p:txBody>
+      </p:sp>
+      <p:pic>
+        <p:nvPicPr>
+          <p:cNvPr id="2050" name="Picture 2" descr="F:\Pipo\Sync\Google Drive\Fewlaps\Resources\Logos Fewlaps\Fewlaps blanc (fons transparent).png"/>
+          <p:cNvPicPr>
+            <a:picLocks noChangeAspect="1" noChangeArrowheads="1"/>
+          </p:cNvPicPr>
+          <p:nvPr/>
+        </p:nvPicPr>
+        <p:blipFill>
+          <a:blip r:embed="rId2" cstate="print">
+            <a:duotone>
+              <a:schemeClr val="accent6">
+                <a:shade val="45000"/>
+                <a:satMod val="135000"/>
+              </a:schemeClr>
+              <a:prstClr val="white"/>
+            </a:duotone>
+            <a:extLst>
+              <a:ext uri="{BEBA8EAE-BF5A-486C-A8C5-ECC9F3942E4B}">
+                <a14:imgProps xmlns:a14="http://schemas.microsoft.com/office/drawing/2010/main">
+                  <a14:imgLayer r:embed="rId3">
+                    <a14:imgEffect>
+                      <a14:artisticChalkSketch/>
+                    </a14:imgEffect>
+                    <a14:imgEffect>
+                      <a14:sharpenSoften amount="-50000"/>
+                    </a14:imgEffect>
+                    <a14:imgEffect>
+                      <a14:colorTemperature colorTemp="4700"/>
+                    </a14:imgEffect>
+                    <a14:imgEffect>
+                      <a14:saturation sat="400000"/>
+                    </a14:imgEffect>
+                  </a14:imgLayer>
+                </a14:imgProps>
+              </a:ext>
+              <a:ext uri="{28A0092B-C50C-407E-A947-70E740481C1C}">
+                <a14:useLocalDpi xmlns:a14="http://schemas.microsoft.com/office/drawing/2010/main" val="0"/>
+              </a:ext>
+            </a:extLst>
+          </a:blip>
+          <a:srcRect/>
+          <a:stretch>
+            <a:fillRect/>
+          </a:stretch>
+        </p:blipFill>
+        <p:spPr bwMode="auto">
+          <a:xfrm>
+            <a:off x="4001349" y="6222294"/>
+            <a:ext cx="1141301" cy="318067"/>
+          </a:xfrm>
+          <a:prstGeom prst="rect">
+            <a:avLst/>
+          </a:prstGeom>
+          <a:noFill/>
+        </p:spPr>
+      </p:pic>
+    </p:spTree>
+    <p:extLst>
+      <p:ext uri="{BB962C8B-B14F-4D97-AF65-F5344CB8AC3E}">
+        <p14:creationId xmlns:p14="http://schemas.microsoft.com/office/powerpoint/2010/main" val="493986890"/>
       </p:ext>
     </p:extLst>
   </p:cSld>

</xml_diff>

<commit_message>
Fix a typo in the 'differences' page
</commit_message>
<xml_diff>
--- a/From CVS to GIT.pptx
+++ b/From CVS to GIT.pptx
@@ -3627,7 +3627,7 @@
                   </a:schemeClr>
                 </a:solidFill>
               </a:rPr>
-              <a:t>goes</a:t>
+              <a:t>go</a:t>
             </a:r>
             <a:r>
               <a:rPr lang="es-ES" sz="2800" dirty="0" smtClean="0">
@@ -3832,8 +3832,27 @@
                   </a:schemeClr>
                 </a:solidFill>
               </a:rPr>
-              <a:t> server</a:t>
-            </a:r>
+              <a:t> </a:t>
+            </a:r>
+            <a:r>
+              <a:rPr lang="es-ES" sz="2800" dirty="0" err="1" smtClean="0">
+                <a:solidFill>
+                  <a:schemeClr val="bg1">
+                    <a:lumMod val="50000"/>
+                    <a:lumOff val="50000"/>
+                  </a:schemeClr>
+                </a:solidFill>
+              </a:rPr>
+              <a:t>localhost</a:t>
+            </a:r>
+            <a:endParaRPr lang="es-ES" sz="2800" dirty="0" smtClean="0">
+              <a:solidFill>
+                <a:schemeClr val="bg1">
+                  <a:lumMod val="50000"/>
+                  <a:lumOff val="50000"/>
+                </a:schemeClr>
+              </a:solidFill>
+            </a:endParaRPr>
           </a:p>
           <a:p>
             <a:pPr algn="ctr"/>
@@ -3901,8 +3920,27 @@
                   </a:schemeClr>
                 </a:solidFill>
               </a:rPr>
-              <a:t> server</a:t>
-            </a:r>
+              <a:t> </a:t>
+            </a:r>
+            <a:r>
+              <a:rPr lang="es-ES" sz="2800" dirty="0" err="1">
+                <a:solidFill>
+                  <a:schemeClr val="bg1">
+                    <a:lumMod val="50000"/>
+                    <a:lumOff val="50000"/>
+                  </a:schemeClr>
+                </a:solidFill>
+              </a:rPr>
+              <a:t>localhost</a:t>
+            </a:r>
+            <a:endParaRPr lang="es-ES" sz="2800" dirty="0" smtClean="0">
+              <a:solidFill>
+                <a:schemeClr val="bg1">
+                  <a:lumMod val="50000"/>
+                  <a:lumOff val="50000"/>
+                </a:schemeClr>
+              </a:solidFill>
+            </a:endParaRPr>
           </a:p>
           <a:p>
             <a:pPr algn="ctr"/>
@@ -3937,7 +3975,7 @@
                   </a:schemeClr>
                 </a:solidFill>
               </a:rPr>
-              <a:t>goes</a:t>
+              <a:t>go</a:t>
             </a:r>
             <a:r>
               <a:rPr lang="es-ES" sz="2800" dirty="0" smtClean="0">
@@ -3970,8 +4008,27 @@
                   </a:schemeClr>
                 </a:solidFill>
               </a:rPr>
-              <a:t> server</a:t>
-            </a:r>
+              <a:t> </a:t>
+            </a:r>
+            <a:r>
+              <a:rPr lang="es-ES" sz="2800" dirty="0" err="1">
+                <a:solidFill>
+                  <a:schemeClr val="bg1">
+                    <a:lumMod val="50000"/>
+                    <a:lumOff val="50000"/>
+                  </a:schemeClr>
+                </a:solidFill>
+              </a:rPr>
+              <a:t>localhost</a:t>
+            </a:r>
+            <a:endParaRPr lang="es-ES" sz="2800" dirty="0" smtClean="0">
+              <a:solidFill>
+                <a:schemeClr val="bg1">
+                  <a:lumMod val="50000"/>
+                  <a:lumOff val="50000"/>
+                </a:schemeClr>
+              </a:solidFill>
+            </a:endParaRPr>
           </a:p>
           <a:p>
             <a:pPr algn="ctr"/>
@@ -8926,11 +8983,7 @@
             </a:r>
             <a:r>
               <a:rPr lang="es-ES" sz="2800" dirty="0"/>
-              <a:t> </a:t>
-            </a:r>
-            <a:r>
-              <a:rPr lang="es-ES" sz="2800" dirty="0"/>
-              <a:t>clone https://github.com/rocboronat/from-cvs-to-git</a:t>
+              <a:t> clone https://github.com/rocboronat/from-cvs-to-git</a:t>
             </a:r>
             <a:endParaRPr lang="es-ES" sz="2800" i="1" dirty="0"/>
           </a:p>

</xml_diff>